<commit_message>
The figure was improved by adding two separate genes
</commit_message>
<xml_diff>
--- a/images/hypothesis_domains.pptx
+++ b/images/hypothesis_domains.pptx
@@ -7,7 +7,7 @@
   <p:sldIdLst>
     <p:sldId id="256" r:id="rId2"/>
   </p:sldIdLst>
-  <p:sldSz cx="8229600" cy="5486400"/>
+  <p:sldSz cx="8229600" cy="8229600"/>
   <p:notesSz cx="6858000" cy="9144000"/>
   <p:defaultTextStyle>
     <a:defPPr>
@@ -107,7 +107,7 @@
   <p:extLst>
     <p:ext uri="{EFAFB233-063F-42B5-8137-9DF3F51BA10A}">
       <p15:sldGuideLst xmlns:p15="http://schemas.microsoft.com/office/powerpoint/2012/main">
-        <p15:guide id="1" orient="horz" pos="1730" userDrawn="1">
+        <p15:guide id="1" orient="horz" pos="2595" userDrawn="1">
           <p15:clr>
             <a:srgbClr val="A4A3A4"/>
           </p15:clr>
@@ -152,8 +152,8 @@
         </p:nvSpPr>
         <p:spPr>
           <a:xfrm>
-            <a:off x="617228" y="1704351"/>
-            <a:ext cx="6995159" cy="1176020"/>
+            <a:off x="617228" y="2556527"/>
+            <a:ext cx="6995159" cy="1764030"/>
           </a:xfrm>
         </p:spPr>
         <p:txBody>
@@ -180,8 +180,8 @@
         </p:nvSpPr>
         <p:spPr>
           <a:xfrm>
-            <a:off x="1234447" y="3108966"/>
-            <a:ext cx="5760721" cy="1402079"/>
+            <a:off x="1234447" y="4663451"/>
+            <a:ext cx="5760721" cy="2103119"/>
           </a:xfrm>
         </p:spPr>
         <p:txBody>
@@ -197,7 +197,7 @@
                 </a:solidFill>
               </a:defRPr>
             </a:lvl1pPr>
-            <a:lvl2pPr marL="1439700" indent="0" algn="ctr">
+            <a:lvl2pPr marL="2159496" indent="0" algn="ctr">
               <a:buNone/>
               <a:defRPr>
                 <a:solidFill>
@@ -207,7 +207,7 @@
                 </a:solidFill>
               </a:defRPr>
             </a:lvl2pPr>
-            <a:lvl3pPr marL="2879414" indent="0" algn="ctr">
+            <a:lvl3pPr marL="4319013" indent="0" algn="ctr">
               <a:buNone/>
               <a:defRPr>
                 <a:solidFill>
@@ -217,7 +217,7 @@
                 </a:solidFill>
               </a:defRPr>
             </a:lvl3pPr>
-            <a:lvl4pPr marL="4319114" indent="0" algn="ctr">
+            <a:lvl4pPr marL="6478509" indent="0" algn="ctr">
               <a:buNone/>
               <a:defRPr>
                 <a:solidFill>
@@ -227,7 +227,7 @@
                 </a:solidFill>
               </a:defRPr>
             </a:lvl4pPr>
-            <a:lvl5pPr marL="5758813" indent="0" algn="ctr">
+            <a:lvl5pPr marL="8638003" indent="0" algn="ctr">
               <a:buNone/>
               <a:defRPr>
                 <a:solidFill>
@@ -237,7 +237,7 @@
                 </a:solidFill>
               </a:defRPr>
             </a:lvl5pPr>
-            <a:lvl6pPr marL="7198531" indent="0" algn="ctr">
+            <a:lvl6pPr marL="10797526" indent="0" algn="ctr">
               <a:buNone/>
               <a:defRPr>
                 <a:solidFill>
@@ -247,7 +247,7 @@
                 </a:solidFill>
               </a:defRPr>
             </a:lvl6pPr>
-            <a:lvl7pPr marL="8638231" indent="0" algn="ctr">
+            <a:lvl7pPr marL="12957022" indent="0" algn="ctr">
               <a:buNone/>
               <a:defRPr>
                 <a:solidFill>
@@ -257,7 +257,7 @@
                 </a:solidFill>
               </a:defRPr>
             </a:lvl7pPr>
-            <a:lvl8pPr marL="10077944" indent="0" algn="ctr">
+            <a:lvl8pPr marL="15116538" indent="0" algn="ctr">
               <a:buNone/>
               <a:defRPr>
                 <a:solidFill>
@@ -267,7 +267,7 @@
                 </a:solidFill>
               </a:defRPr>
             </a:lvl8pPr>
-            <a:lvl9pPr marL="11517656" indent="0" algn="ctr">
+            <a:lvl9pPr marL="17276052" indent="0" algn="ctr">
               <a:buNone/>
               <a:defRPr>
                 <a:solidFill>
@@ -304,7 +304,7 @@
           <a:p>
             <a:fld id="{01197F44-DB72-474A-9754-31703E05C006}" type="datetimeFigureOut">
               <a:rPr lang="en-US" smtClean="0"/>
-              <a:t>11/14/19</a:t>
+              <a:t>11/23/19</a:t>
             </a:fld>
             <a:endParaRPr lang="en-US"/>
           </a:p>
@@ -474,7 +474,7 @@
           <a:p>
             <a:fld id="{01197F44-DB72-474A-9754-31703E05C006}" type="datetimeFigureOut">
               <a:rPr lang="en-US" smtClean="0"/>
-              <a:t>11/14/19</a:t>
+              <a:t>11/23/19</a:t>
             </a:fld>
             <a:endParaRPr lang="en-US"/>
           </a:p>
@@ -564,8 +564,8 @@
         </p:nvSpPr>
         <p:spPr>
           <a:xfrm>
-            <a:off x="5966463" y="219718"/>
-            <a:ext cx="1851660" cy="4681223"/>
+            <a:off x="5966463" y="329578"/>
+            <a:ext cx="1851660" cy="7021835"/>
           </a:xfrm>
         </p:spPr>
         <p:txBody>
@@ -592,8 +592,8 @@
         </p:nvSpPr>
         <p:spPr>
           <a:xfrm>
-            <a:off x="411485" y="219718"/>
-            <a:ext cx="5417820" cy="4681223"/>
+            <a:off x="411485" y="329578"/>
+            <a:ext cx="5417820" cy="7021835"/>
           </a:xfrm>
         </p:spPr>
         <p:txBody>
@@ -654,7 +654,7 @@
           <a:p>
             <a:fld id="{01197F44-DB72-474A-9754-31703E05C006}" type="datetimeFigureOut">
               <a:rPr lang="en-US" smtClean="0"/>
-              <a:t>11/14/19</a:t>
+              <a:t>11/23/19</a:t>
             </a:fld>
             <a:endParaRPr lang="en-US"/>
           </a:p>
@@ -824,7 +824,7 @@
           <a:p>
             <a:fld id="{01197F44-DB72-474A-9754-31703E05C006}" type="datetimeFigureOut">
               <a:rPr lang="en-US" smtClean="0"/>
-              <a:t>11/14/19</a:t>
+              <a:t>11/23/19</a:t>
             </a:fld>
             <a:endParaRPr lang="en-US"/>
           </a:p>
@@ -914,15 +914,15 @@
         </p:nvSpPr>
         <p:spPr>
           <a:xfrm>
-            <a:off x="650090" y="3525529"/>
-            <a:ext cx="6995159" cy="1089663"/>
+            <a:off x="650092" y="5288294"/>
+            <a:ext cx="6995159" cy="1634495"/>
           </a:xfrm>
         </p:spPr>
         <p:txBody>
           <a:bodyPr anchor="t"/>
           <a:lstStyle>
             <a:lvl1pPr algn="l">
-              <a:defRPr sz="12757" b="1" cap="all"/>
+              <a:defRPr sz="19135" b="1" cap="all"/>
             </a:lvl1pPr>
           </a:lstStyle>
           <a:p>
@@ -946,8 +946,8 @@
         </p:nvSpPr>
         <p:spPr>
           <a:xfrm>
-            <a:off x="650090" y="2325377"/>
-            <a:ext cx="6995159" cy="1200150"/>
+            <a:off x="650092" y="3488066"/>
+            <a:ext cx="6995159" cy="1800225"/>
           </a:xfrm>
         </p:spPr>
         <p:txBody>
@@ -955,7 +955,7 @@
           <a:lstStyle>
             <a:lvl1pPr marL="0" indent="0">
               <a:buNone/>
-              <a:defRPr sz="6807">
+              <a:defRPr sz="10211">
                 <a:solidFill>
                   <a:schemeClr val="tx1">
                     <a:tint val="75000"/>
@@ -963,9 +963,9 @@
                 </a:solidFill>
               </a:defRPr>
             </a:lvl1pPr>
-            <a:lvl2pPr marL="1439700" indent="0">
-              <a:buNone/>
-              <a:defRPr sz="5953">
+            <a:lvl2pPr marL="2159496" indent="0">
+              <a:buNone/>
+              <a:defRPr sz="8929">
                 <a:solidFill>
                   <a:schemeClr val="tx1">
                     <a:tint val="75000"/>
@@ -973,9 +973,9 @@
                 </a:solidFill>
               </a:defRPr>
             </a:lvl2pPr>
-            <a:lvl3pPr marL="2879414" indent="0">
-              <a:buNone/>
-              <a:defRPr sz="5103">
+            <a:lvl3pPr marL="4319013" indent="0">
+              <a:buNone/>
+              <a:defRPr sz="7655">
                 <a:solidFill>
                   <a:schemeClr val="tx1">
                     <a:tint val="75000"/>
@@ -983,9 +983,9 @@
                 </a:solidFill>
               </a:defRPr>
             </a:lvl3pPr>
-            <a:lvl4pPr marL="4319114" indent="0">
-              <a:buNone/>
-              <a:defRPr sz="4252">
+            <a:lvl4pPr marL="6478509" indent="0">
+              <a:buNone/>
+              <a:defRPr sz="6378">
                 <a:solidFill>
                   <a:schemeClr val="tx1">
                     <a:tint val="75000"/>
@@ -993,9 +993,9 @@
                 </a:solidFill>
               </a:defRPr>
             </a:lvl4pPr>
-            <a:lvl5pPr marL="5758813" indent="0">
-              <a:buNone/>
-              <a:defRPr sz="4252">
+            <a:lvl5pPr marL="8638003" indent="0">
+              <a:buNone/>
+              <a:defRPr sz="6378">
                 <a:solidFill>
                   <a:schemeClr val="tx1">
                     <a:tint val="75000"/>
@@ -1003,9 +1003,9 @@
                 </a:solidFill>
               </a:defRPr>
             </a:lvl5pPr>
-            <a:lvl6pPr marL="7198531" indent="0">
-              <a:buNone/>
-              <a:defRPr sz="4252">
+            <a:lvl6pPr marL="10797526" indent="0">
+              <a:buNone/>
+              <a:defRPr sz="6378">
                 <a:solidFill>
                   <a:schemeClr val="tx1">
                     <a:tint val="75000"/>
@@ -1013,9 +1013,9 @@
                 </a:solidFill>
               </a:defRPr>
             </a:lvl6pPr>
-            <a:lvl7pPr marL="8638231" indent="0">
-              <a:buNone/>
-              <a:defRPr sz="4252">
+            <a:lvl7pPr marL="12957022" indent="0">
+              <a:buNone/>
+              <a:defRPr sz="6378">
                 <a:solidFill>
                   <a:schemeClr val="tx1">
                     <a:tint val="75000"/>
@@ -1023,9 +1023,9 @@
                 </a:solidFill>
               </a:defRPr>
             </a:lvl7pPr>
-            <a:lvl8pPr marL="10077944" indent="0">
-              <a:buNone/>
-              <a:defRPr sz="4252">
+            <a:lvl8pPr marL="15116538" indent="0">
+              <a:buNone/>
+              <a:defRPr sz="6378">
                 <a:solidFill>
                   <a:schemeClr val="tx1">
                     <a:tint val="75000"/>
@@ -1033,9 +1033,9 @@
                 </a:solidFill>
               </a:defRPr>
             </a:lvl8pPr>
-            <a:lvl9pPr marL="11517656" indent="0">
-              <a:buNone/>
-              <a:defRPr sz="4252">
+            <a:lvl9pPr marL="17276052" indent="0">
+              <a:buNone/>
+              <a:defRPr sz="6378">
                 <a:solidFill>
                   <a:schemeClr val="tx1">
                     <a:tint val="75000"/>
@@ -1070,7 +1070,7 @@
           <a:p>
             <a:fld id="{01197F44-DB72-474A-9754-31703E05C006}" type="datetimeFigureOut">
               <a:rPr lang="en-US" smtClean="0"/>
-              <a:t>11/14/19</a:t>
+              <a:t>11/23/19</a:t>
             </a:fld>
             <a:endParaRPr lang="en-US"/>
           </a:p>
@@ -1183,39 +1183,39 @@
         </p:nvSpPr>
         <p:spPr>
           <a:xfrm>
-            <a:off x="411488" y="1280173"/>
-            <a:ext cx="3634741" cy="3620771"/>
+            <a:off x="411490" y="1920261"/>
+            <a:ext cx="3634741" cy="5431157"/>
           </a:xfrm>
         </p:spPr>
         <p:txBody>
           <a:bodyPr/>
           <a:lstStyle>
             <a:lvl1pPr>
-              <a:defRPr sz="9355"/>
+              <a:defRPr sz="14032"/>
             </a:lvl1pPr>
             <a:lvl2pPr>
-              <a:defRPr sz="7654"/>
+              <a:defRPr sz="11481"/>
             </a:lvl2pPr>
             <a:lvl3pPr>
-              <a:defRPr sz="6807"/>
+              <a:defRPr sz="10211"/>
             </a:lvl3pPr>
             <a:lvl4pPr>
-              <a:defRPr sz="5953"/>
+              <a:defRPr sz="8929"/>
             </a:lvl4pPr>
             <a:lvl5pPr>
-              <a:defRPr sz="5953"/>
+              <a:defRPr sz="8929"/>
             </a:lvl5pPr>
             <a:lvl6pPr>
-              <a:defRPr sz="5953"/>
+              <a:defRPr sz="8929"/>
             </a:lvl6pPr>
             <a:lvl7pPr>
-              <a:defRPr sz="5953"/>
+              <a:defRPr sz="8929"/>
             </a:lvl7pPr>
             <a:lvl8pPr>
-              <a:defRPr sz="5953"/>
+              <a:defRPr sz="8929"/>
             </a:lvl8pPr>
             <a:lvl9pPr>
-              <a:defRPr sz="5953"/>
+              <a:defRPr sz="8929"/>
             </a:lvl9pPr>
           </a:lstStyle>
           <a:p>
@@ -1268,39 +1268,39 @@
         </p:nvSpPr>
         <p:spPr>
           <a:xfrm>
-            <a:off x="4183388" y="1280173"/>
-            <a:ext cx="3634741" cy="3620771"/>
+            <a:off x="4183390" y="1920261"/>
+            <a:ext cx="3634741" cy="5431157"/>
           </a:xfrm>
         </p:spPr>
         <p:txBody>
           <a:bodyPr/>
           <a:lstStyle>
             <a:lvl1pPr>
-              <a:defRPr sz="9355"/>
+              <a:defRPr sz="14032"/>
             </a:lvl1pPr>
             <a:lvl2pPr>
-              <a:defRPr sz="7654"/>
+              <a:defRPr sz="11481"/>
             </a:lvl2pPr>
             <a:lvl3pPr>
-              <a:defRPr sz="6807"/>
+              <a:defRPr sz="10211"/>
             </a:lvl3pPr>
             <a:lvl4pPr>
-              <a:defRPr sz="5953"/>
+              <a:defRPr sz="8929"/>
             </a:lvl4pPr>
             <a:lvl5pPr>
-              <a:defRPr sz="5953"/>
+              <a:defRPr sz="8929"/>
             </a:lvl5pPr>
             <a:lvl6pPr>
-              <a:defRPr sz="5953"/>
+              <a:defRPr sz="8929"/>
             </a:lvl6pPr>
             <a:lvl7pPr>
-              <a:defRPr sz="5953"/>
+              <a:defRPr sz="8929"/>
             </a:lvl7pPr>
             <a:lvl8pPr>
-              <a:defRPr sz="5953"/>
+              <a:defRPr sz="8929"/>
             </a:lvl8pPr>
             <a:lvl9pPr>
-              <a:defRPr sz="5953"/>
+              <a:defRPr sz="8929"/>
             </a:lvl9pPr>
           </a:lstStyle>
           <a:p>
@@ -1358,7 +1358,7 @@
           <a:p>
             <a:fld id="{01197F44-DB72-474A-9754-31703E05C006}" type="datetimeFigureOut">
               <a:rPr lang="en-US" smtClean="0"/>
-              <a:t>11/14/19</a:t>
+              <a:t>11/23/19</a:t>
             </a:fld>
             <a:endParaRPr lang="en-US"/>
           </a:p>
@@ -1475,8 +1475,8 @@
         </p:nvSpPr>
         <p:spPr>
           <a:xfrm>
-            <a:off x="411491" y="1228098"/>
-            <a:ext cx="3636170" cy="511808"/>
+            <a:off x="411491" y="1842148"/>
+            <a:ext cx="3636170" cy="767712"/>
           </a:xfrm>
         </p:spPr>
         <p:txBody>
@@ -1484,39 +1484,39 @@
           <a:lstStyle>
             <a:lvl1pPr marL="0" indent="0">
               <a:buNone/>
-              <a:defRPr sz="7654" b="1"/>
+              <a:defRPr sz="11481" b="1"/>
             </a:lvl1pPr>
-            <a:lvl2pPr marL="1439700" indent="0">
-              <a:buNone/>
-              <a:defRPr sz="6807" b="1"/>
+            <a:lvl2pPr marL="2159496" indent="0">
+              <a:buNone/>
+              <a:defRPr sz="10211" b="1"/>
             </a:lvl2pPr>
-            <a:lvl3pPr marL="2879414" indent="0">
-              <a:buNone/>
-              <a:defRPr sz="5953" b="1"/>
+            <a:lvl3pPr marL="4319013" indent="0">
+              <a:buNone/>
+              <a:defRPr sz="8929" b="1"/>
             </a:lvl3pPr>
-            <a:lvl4pPr marL="4319114" indent="0">
-              <a:buNone/>
-              <a:defRPr sz="5103" b="1"/>
+            <a:lvl4pPr marL="6478509" indent="0">
+              <a:buNone/>
+              <a:defRPr sz="7655" b="1"/>
             </a:lvl4pPr>
-            <a:lvl5pPr marL="5758813" indent="0">
-              <a:buNone/>
-              <a:defRPr sz="5103" b="1"/>
+            <a:lvl5pPr marL="8638003" indent="0">
+              <a:buNone/>
+              <a:defRPr sz="7655" b="1"/>
             </a:lvl5pPr>
-            <a:lvl6pPr marL="7198531" indent="0">
-              <a:buNone/>
-              <a:defRPr sz="5103" b="1"/>
+            <a:lvl6pPr marL="10797526" indent="0">
+              <a:buNone/>
+              <a:defRPr sz="7655" b="1"/>
             </a:lvl6pPr>
-            <a:lvl7pPr marL="8638231" indent="0">
-              <a:buNone/>
-              <a:defRPr sz="5103" b="1"/>
+            <a:lvl7pPr marL="12957022" indent="0">
+              <a:buNone/>
+              <a:defRPr sz="7655" b="1"/>
             </a:lvl7pPr>
-            <a:lvl8pPr marL="10077944" indent="0">
-              <a:buNone/>
-              <a:defRPr sz="5103" b="1"/>
+            <a:lvl8pPr marL="15116538" indent="0">
+              <a:buNone/>
+              <a:defRPr sz="7655" b="1"/>
             </a:lvl8pPr>
-            <a:lvl9pPr marL="11517656" indent="0">
-              <a:buNone/>
-              <a:defRPr sz="5103" b="1"/>
+            <a:lvl9pPr marL="17276052" indent="0">
+              <a:buNone/>
+              <a:defRPr sz="7655" b="1"/>
             </a:lvl9pPr>
           </a:lstStyle>
           <a:p>
@@ -1540,39 +1540,39 @@
         </p:nvSpPr>
         <p:spPr>
           <a:xfrm>
-            <a:off x="411491" y="1739900"/>
-            <a:ext cx="3636170" cy="3161033"/>
+            <a:off x="411491" y="2609851"/>
+            <a:ext cx="3636170" cy="4741550"/>
           </a:xfrm>
         </p:spPr>
         <p:txBody>
           <a:bodyPr/>
           <a:lstStyle>
             <a:lvl1pPr>
-              <a:defRPr sz="7654"/>
+              <a:defRPr sz="11481"/>
             </a:lvl1pPr>
             <a:lvl2pPr>
-              <a:defRPr sz="6807"/>
+              <a:defRPr sz="10211"/>
             </a:lvl2pPr>
             <a:lvl3pPr>
-              <a:defRPr sz="5953"/>
+              <a:defRPr sz="8929"/>
             </a:lvl3pPr>
             <a:lvl4pPr>
-              <a:defRPr sz="5103"/>
+              <a:defRPr sz="7655"/>
             </a:lvl4pPr>
             <a:lvl5pPr>
-              <a:defRPr sz="5103"/>
+              <a:defRPr sz="7655"/>
             </a:lvl5pPr>
             <a:lvl6pPr>
-              <a:defRPr sz="5103"/>
+              <a:defRPr sz="7655"/>
             </a:lvl6pPr>
             <a:lvl7pPr>
-              <a:defRPr sz="5103"/>
+              <a:defRPr sz="7655"/>
             </a:lvl7pPr>
             <a:lvl8pPr>
-              <a:defRPr sz="5103"/>
+              <a:defRPr sz="7655"/>
             </a:lvl8pPr>
             <a:lvl9pPr>
-              <a:defRPr sz="5103"/>
+              <a:defRPr sz="7655"/>
             </a:lvl9pPr>
           </a:lstStyle>
           <a:p>
@@ -1625,8 +1625,8 @@
         </p:nvSpPr>
         <p:spPr>
           <a:xfrm>
-            <a:off x="4180529" y="1228098"/>
-            <a:ext cx="3637599" cy="511808"/>
+            <a:off x="4180531" y="1842148"/>
+            <a:ext cx="3637599" cy="767712"/>
           </a:xfrm>
         </p:spPr>
         <p:txBody>
@@ -1634,39 +1634,39 @@
           <a:lstStyle>
             <a:lvl1pPr marL="0" indent="0">
               <a:buNone/>
-              <a:defRPr sz="7654" b="1"/>
+              <a:defRPr sz="11481" b="1"/>
             </a:lvl1pPr>
-            <a:lvl2pPr marL="1439700" indent="0">
-              <a:buNone/>
-              <a:defRPr sz="6807" b="1"/>
+            <a:lvl2pPr marL="2159496" indent="0">
+              <a:buNone/>
+              <a:defRPr sz="10211" b="1"/>
             </a:lvl2pPr>
-            <a:lvl3pPr marL="2879414" indent="0">
-              <a:buNone/>
-              <a:defRPr sz="5953" b="1"/>
+            <a:lvl3pPr marL="4319013" indent="0">
+              <a:buNone/>
+              <a:defRPr sz="8929" b="1"/>
             </a:lvl3pPr>
-            <a:lvl4pPr marL="4319114" indent="0">
-              <a:buNone/>
-              <a:defRPr sz="5103" b="1"/>
+            <a:lvl4pPr marL="6478509" indent="0">
+              <a:buNone/>
+              <a:defRPr sz="7655" b="1"/>
             </a:lvl4pPr>
-            <a:lvl5pPr marL="5758813" indent="0">
-              <a:buNone/>
-              <a:defRPr sz="5103" b="1"/>
+            <a:lvl5pPr marL="8638003" indent="0">
+              <a:buNone/>
+              <a:defRPr sz="7655" b="1"/>
             </a:lvl5pPr>
-            <a:lvl6pPr marL="7198531" indent="0">
-              <a:buNone/>
-              <a:defRPr sz="5103" b="1"/>
+            <a:lvl6pPr marL="10797526" indent="0">
+              <a:buNone/>
+              <a:defRPr sz="7655" b="1"/>
             </a:lvl6pPr>
-            <a:lvl7pPr marL="8638231" indent="0">
-              <a:buNone/>
-              <a:defRPr sz="5103" b="1"/>
+            <a:lvl7pPr marL="12957022" indent="0">
+              <a:buNone/>
+              <a:defRPr sz="7655" b="1"/>
             </a:lvl7pPr>
-            <a:lvl8pPr marL="10077944" indent="0">
-              <a:buNone/>
-              <a:defRPr sz="5103" b="1"/>
+            <a:lvl8pPr marL="15116538" indent="0">
+              <a:buNone/>
+              <a:defRPr sz="7655" b="1"/>
             </a:lvl8pPr>
-            <a:lvl9pPr marL="11517656" indent="0">
-              <a:buNone/>
-              <a:defRPr sz="5103" b="1"/>
+            <a:lvl9pPr marL="17276052" indent="0">
+              <a:buNone/>
+              <a:defRPr sz="7655" b="1"/>
             </a:lvl9pPr>
           </a:lstStyle>
           <a:p>
@@ -1690,39 +1690,39 @@
         </p:nvSpPr>
         <p:spPr>
           <a:xfrm>
-            <a:off x="4180529" y="1739900"/>
-            <a:ext cx="3637599" cy="3161033"/>
+            <a:off x="4180531" y="2609851"/>
+            <a:ext cx="3637599" cy="4741550"/>
           </a:xfrm>
         </p:spPr>
         <p:txBody>
           <a:bodyPr/>
           <a:lstStyle>
             <a:lvl1pPr>
-              <a:defRPr sz="7654"/>
+              <a:defRPr sz="11481"/>
             </a:lvl1pPr>
             <a:lvl2pPr>
-              <a:defRPr sz="6807"/>
+              <a:defRPr sz="10211"/>
             </a:lvl2pPr>
             <a:lvl3pPr>
-              <a:defRPr sz="5953"/>
+              <a:defRPr sz="8929"/>
             </a:lvl3pPr>
             <a:lvl4pPr>
-              <a:defRPr sz="5103"/>
+              <a:defRPr sz="7655"/>
             </a:lvl4pPr>
             <a:lvl5pPr>
-              <a:defRPr sz="5103"/>
+              <a:defRPr sz="7655"/>
             </a:lvl5pPr>
             <a:lvl6pPr>
-              <a:defRPr sz="5103"/>
+              <a:defRPr sz="7655"/>
             </a:lvl6pPr>
             <a:lvl7pPr>
-              <a:defRPr sz="5103"/>
+              <a:defRPr sz="7655"/>
             </a:lvl7pPr>
             <a:lvl8pPr>
-              <a:defRPr sz="5103"/>
+              <a:defRPr sz="7655"/>
             </a:lvl8pPr>
             <a:lvl9pPr>
-              <a:defRPr sz="5103"/>
+              <a:defRPr sz="7655"/>
             </a:lvl9pPr>
           </a:lstStyle>
           <a:p>
@@ -1780,7 +1780,7 @@
           <a:p>
             <a:fld id="{01197F44-DB72-474A-9754-31703E05C006}" type="datetimeFigureOut">
               <a:rPr lang="en-US" smtClean="0"/>
-              <a:t>11/14/19</a:t>
+              <a:t>11/23/19</a:t>
             </a:fld>
             <a:endParaRPr lang="en-US"/>
           </a:p>
@@ -1898,7 +1898,7 @@
           <a:p>
             <a:fld id="{01197F44-DB72-474A-9754-31703E05C006}" type="datetimeFigureOut">
               <a:rPr lang="en-US" smtClean="0"/>
-              <a:t>11/14/19</a:t>
+              <a:t>11/23/19</a:t>
             </a:fld>
             <a:endParaRPr lang="en-US"/>
           </a:p>
@@ -1993,7 +1993,7 @@
           <a:p>
             <a:fld id="{01197F44-DB72-474A-9754-31703E05C006}" type="datetimeFigureOut">
               <a:rPr lang="en-US" smtClean="0"/>
-              <a:t>11/14/19</a:t>
+              <a:t>11/23/19</a:t>
             </a:fld>
             <a:endParaRPr lang="en-US"/>
           </a:p>
@@ -2083,15 +2083,15 @@
         </p:nvSpPr>
         <p:spPr>
           <a:xfrm>
-            <a:off x="411486" y="218448"/>
-            <a:ext cx="2707482" cy="929639"/>
+            <a:off x="411486" y="327674"/>
+            <a:ext cx="2707482" cy="1394459"/>
           </a:xfrm>
         </p:spPr>
         <p:txBody>
           <a:bodyPr anchor="b"/>
           <a:lstStyle>
             <a:lvl1pPr algn="l">
-              <a:defRPr sz="6807" b="1"/>
+              <a:defRPr sz="10211" b="1"/>
             </a:lvl1pPr>
           </a:lstStyle>
           <a:p>
@@ -2115,39 +2115,39 @@
         </p:nvSpPr>
         <p:spPr>
           <a:xfrm>
-            <a:off x="3217555" y="218446"/>
-            <a:ext cx="4600576" cy="4682490"/>
+            <a:off x="3217555" y="327669"/>
+            <a:ext cx="4600576" cy="7023735"/>
           </a:xfrm>
         </p:spPr>
         <p:txBody>
           <a:bodyPr/>
           <a:lstStyle>
             <a:lvl1pPr>
-              <a:defRPr sz="11059"/>
+              <a:defRPr sz="16588"/>
             </a:lvl1pPr>
             <a:lvl2pPr>
-              <a:defRPr sz="9355"/>
+              <a:defRPr sz="14032"/>
             </a:lvl2pPr>
             <a:lvl3pPr>
-              <a:defRPr sz="7654"/>
+              <a:defRPr sz="11481"/>
             </a:lvl3pPr>
             <a:lvl4pPr>
-              <a:defRPr sz="6807"/>
+              <a:defRPr sz="10211"/>
             </a:lvl4pPr>
             <a:lvl5pPr>
-              <a:defRPr sz="6807"/>
+              <a:defRPr sz="10211"/>
             </a:lvl5pPr>
             <a:lvl6pPr>
-              <a:defRPr sz="6807"/>
+              <a:defRPr sz="10211"/>
             </a:lvl6pPr>
             <a:lvl7pPr>
-              <a:defRPr sz="6807"/>
+              <a:defRPr sz="10211"/>
             </a:lvl7pPr>
             <a:lvl8pPr>
-              <a:defRPr sz="6807"/>
+              <a:defRPr sz="10211"/>
             </a:lvl8pPr>
             <a:lvl9pPr>
-              <a:defRPr sz="6807"/>
+              <a:defRPr sz="10211"/>
             </a:lvl9pPr>
           </a:lstStyle>
           <a:p>
@@ -2200,8 +2200,8 @@
         </p:nvSpPr>
         <p:spPr>
           <a:xfrm>
-            <a:off x="411486" y="1148088"/>
-            <a:ext cx="2707482" cy="3752852"/>
+            <a:off x="411486" y="1722133"/>
+            <a:ext cx="2707482" cy="5629278"/>
           </a:xfrm>
         </p:spPr>
         <p:txBody>
@@ -2209,39 +2209,39 @@
           <a:lstStyle>
             <a:lvl1pPr marL="0" indent="0">
               <a:buNone/>
-              <a:defRPr sz="4252"/>
+              <a:defRPr sz="6378"/>
             </a:lvl1pPr>
-            <a:lvl2pPr marL="1439700" indent="0">
-              <a:buNone/>
-              <a:defRPr sz="3402"/>
+            <a:lvl2pPr marL="2159496" indent="0">
+              <a:buNone/>
+              <a:defRPr sz="5103"/>
             </a:lvl2pPr>
-            <a:lvl3pPr marL="2879414" indent="0">
-              <a:buNone/>
-              <a:defRPr sz="2551"/>
+            <a:lvl3pPr marL="4319013" indent="0">
+              <a:buNone/>
+              <a:defRPr sz="3826"/>
             </a:lvl3pPr>
-            <a:lvl4pPr marL="4319114" indent="0">
-              <a:buNone/>
-              <a:defRPr sz="2551"/>
+            <a:lvl4pPr marL="6478509" indent="0">
+              <a:buNone/>
+              <a:defRPr sz="3826"/>
             </a:lvl4pPr>
-            <a:lvl5pPr marL="5758813" indent="0">
-              <a:buNone/>
-              <a:defRPr sz="2551"/>
+            <a:lvl5pPr marL="8638003" indent="0">
+              <a:buNone/>
+              <a:defRPr sz="3826"/>
             </a:lvl5pPr>
-            <a:lvl6pPr marL="7198531" indent="0">
-              <a:buNone/>
-              <a:defRPr sz="2551"/>
+            <a:lvl6pPr marL="10797526" indent="0">
+              <a:buNone/>
+              <a:defRPr sz="3826"/>
             </a:lvl6pPr>
-            <a:lvl7pPr marL="8638231" indent="0">
-              <a:buNone/>
-              <a:defRPr sz="2551"/>
+            <a:lvl7pPr marL="12957022" indent="0">
+              <a:buNone/>
+              <a:defRPr sz="3826"/>
             </a:lvl7pPr>
-            <a:lvl8pPr marL="10077944" indent="0">
-              <a:buNone/>
-              <a:defRPr sz="2551"/>
+            <a:lvl8pPr marL="15116538" indent="0">
+              <a:buNone/>
+              <a:defRPr sz="3826"/>
             </a:lvl8pPr>
-            <a:lvl9pPr marL="11517656" indent="0">
-              <a:buNone/>
-              <a:defRPr sz="2551"/>
+            <a:lvl9pPr marL="17276052" indent="0">
+              <a:buNone/>
+              <a:defRPr sz="3826"/>
             </a:lvl9pPr>
           </a:lstStyle>
           <a:p>
@@ -2270,7 +2270,7 @@
           <a:p>
             <a:fld id="{01197F44-DB72-474A-9754-31703E05C006}" type="datetimeFigureOut">
               <a:rPr lang="en-US" smtClean="0"/>
-              <a:t>11/14/19</a:t>
+              <a:t>11/23/19</a:t>
             </a:fld>
             <a:endParaRPr lang="en-US"/>
           </a:p>
@@ -2360,15 +2360,15 @@
         </p:nvSpPr>
         <p:spPr>
           <a:xfrm>
-            <a:off x="1613064" y="3840488"/>
-            <a:ext cx="4937760" cy="453389"/>
+            <a:off x="1613064" y="5760733"/>
+            <a:ext cx="4937760" cy="680084"/>
           </a:xfrm>
         </p:spPr>
         <p:txBody>
           <a:bodyPr anchor="b"/>
           <a:lstStyle>
             <a:lvl1pPr algn="l">
-              <a:defRPr sz="6807" b="1"/>
+              <a:defRPr sz="10211" b="1"/>
             </a:lvl1pPr>
           </a:lstStyle>
           <a:p>
@@ -2392,8 +2392,8 @@
         </p:nvSpPr>
         <p:spPr>
           <a:xfrm>
-            <a:off x="1613064" y="490221"/>
-            <a:ext cx="4937760" cy="3291840"/>
+            <a:off x="1613064" y="735332"/>
+            <a:ext cx="4937760" cy="4937760"/>
           </a:xfrm>
         </p:spPr>
         <p:txBody>
@@ -2401,39 +2401,39 @@
           <a:lstStyle>
             <a:lvl1pPr marL="0" indent="0">
               <a:buNone/>
-              <a:defRPr sz="11059"/>
+              <a:defRPr sz="16588"/>
             </a:lvl1pPr>
-            <a:lvl2pPr marL="1439700" indent="0">
-              <a:buNone/>
-              <a:defRPr sz="9355"/>
+            <a:lvl2pPr marL="2159496" indent="0">
+              <a:buNone/>
+              <a:defRPr sz="14032"/>
             </a:lvl2pPr>
-            <a:lvl3pPr marL="2879414" indent="0">
-              <a:buNone/>
-              <a:defRPr sz="7654"/>
+            <a:lvl3pPr marL="4319013" indent="0">
+              <a:buNone/>
+              <a:defRPr sz="11481"/>
             </a:lvl3pPr>
-            <a:lvl4pPr marL="4319114" indent="0">
-              <a:buNone/>
-              <a:defRPr sz="6807"/>
+            <a:lvl4pPr marL="6478509" indent="0">
+              <a:buNone/>
+              <a:defRPr sz="10211"/>
             </a:lvl4pPr>
-            <a:lvl5pPr marL="5758813" indent="0">
-              <a:buNone/>
-              <a:defRPr sz="6807"/>
+            <a:lvl5pPr marL="8638003" indent="0">
+              <a:buNone/>
+              <a:defRPr sz="10211"/>
             </a:lvl5pPr>
-            <a:lvl6pPr marL="7198531" indent="0">
-              <a:buNone/>
-              <a:defRPr sz="6807"/>
+            <a:lvl6pPr marL="10797526" indent="0">
+              <a:buNone/>
+              <a:defRPr sz="10211"/>
             </a:lvl6pPr>
-            <a:lvl7pPr marL="8638231" indent="0">
-              <a:buNone/>
-              <a:defRPr sz="6807"/>
+            <a:lvl7pPr marL="12957022" indent="0">
+              <a:buNone/>
+              <a:defRPr sz="10211"/>
             </a:lvl7pPr>
-            <a:lvl8pPr marL="10077944" indent="0">
-              <a:buNone/>
-              <a:defRPr sz="6807"/>
+            <a:lvl8pPr marL="15116538" indent="0">
+              <a:buNone/>
+              <a:defRPr sz="10211"/>
             </a:lvl8pPr>
-            <a:lvl9pPr marL="11517656" indent="0">
-              <a:buNone/>
-              <a:defRPr sz="6807"/>
+            <a:lvl9pPr marL="17276052" indent="0">
+              <a:buNone/>
+              <a:defRPr sz="10211"/>
             </a:lvl9pPr>
           </a:lstStyle>
           <a:p>
@@ -2453,8 +2453,8 @@
         </p:nvSpPr>
         <p:spPr>
           <a:xfrm>
-            <a:off x="1613064" y="4293877"/>
-            <a:ext cx="4937760" cy="643892"/>
+            <a:off x="1613064" y="6440816"/>
+            <a:ext cx="4937760" cy="965838"/>
           </a:xfrm>
         </p:spPr>
         <p:txBody>
@@ -2462,39 +2462,39 @@
           <a:lstStyle>
             <a:lvl1pPr marL="0" indent="0">
               <a:buNone/>
-              <a:defRPr sz="4252"/>
+              <a:defRPr sz="6378"/>
             </a:lvl1pPr>
-            <a:lvl2pPr marL="1439700" indent="0">
-              <a:buNone/>
-              <a:defRPr sz="3402"/>
+            <a:lvl2pPr marL="2159496" indent="0">
+              <a:buNone/>
+              <a:defRPr sz="5103"/>
             </a:lvl2pPr>
-            <a:lvl3pPr marL="2879414" indent="0">
-              <a:buNone/>
-              <a:defRPr sz="2551"/>
+            <a:lvl3pPr marL="4319013" indent="0">
+              <a:buNone/>
+              <a:defRPr sz="3826"/>
             </a:lvl3pPr>
-            <a:lvl4pPr marL="4319114" indent="0">
-              <a:buNone/>
-              <a:defRPr sz="2551"/>
+            <a:lvl4pPr marL="6478509" indent="0">
+              <a:buNone/>
+              <a:defRPr sz="3826"/>
             </a:lvl4pPr>
-            <a:lvl5pPr marL="5758813" indent="0">
-              <a:buNone/>
-              <a:defRPr sz="2551"/>
+            <a:lvl5pPr marL="8638003" indent="0">
+              <a:buNone/>
+              <a:defRPr sz="3826"/>
             </a:lvl5pPr>
-            <a:lvl6pPr marL="7198531" indent="0">
-              <a:buNone/>
-              <a:defRPr sz="2551"/>
+            <a:lvl6pPr marL="10797526" indent="0">
+              <a:buNone/>
+              <a:defRPr sz="3826"/>
             </a:lvl6pPr>
-            <a:lvl7pPr marL="8638231" indent="0">
-              <a:buNone/>
-              <a:defRPr sz="2551"/>
+            <a:lvl7pPr marL="12957022" indent="0">
+              <a:buNone/>
+              <a:defRPr sz="3826"/>
             </a:lvl7pPr>
-            <a:lvl8pPr marL="10077944" indent="0">
-              <a:buNone/>
-              <a:defRPr sz="2551"/>
+            <a:lvl8pPr marL="15116538" indent="0">
+              <a:buNone/>
+              <a:defRPr sz="3826"/>
             </a:lvl8pPr>
-            <a:lvl9pPr marL="11517656" indent="0">
-              <a:buNone/>
-              <a:defRPr sz="2551"/>
+            <a:lvl9pPr marL="17276052" indent="0">
+              <a:buNone/>
+              <a:defRPr sz="3826"/>
             </a:lvl9pPr>
           </a:lstStyle>
           <a:p>
@@ -2523,7 +2523,7 @@
           <a:p>
             <a:fld id="{01197F44-DB72-474A-9754-31703E05C006}" type="datetimeFigureOut">
               <a:rPr lang="en-US" smtClean="0"/>
-              <a:t>11/14/19</a:t>
+              <a:t>11/23/19</a:t>
             </a:fld>
             <a:endParaRPr lang="en-US"/>
           </a:p>
@@ -2618,8 +2618,8 @@
         </p:nvSpPr>
         <p:spPr>
           <a:xfrm>
-            <a:off x="411487" y="219716"/>
-            <a:ext cx="7406641" cy="914400"/>
+            <a:off x="411487" y="329574"/>
+            <a:ext cx="7406641" cy="1371600"/>
           </a:xfrm>
           <a:prstGeom prst="rect">
             <a:avLst/>
@@ -2651,8 +2651,8 @@
         </p:nvSpPr>
         <p:spPr>
           <a:xfrm>
-            <a:off x="411487" y="1280173"/>
-            <a:ext cx="7406641" cy="3620771"/>
+            <a:off x="411487" y="1920261"/>
+            <a:ext cx="7406641" cy="5431157"/>
           </a:xfrm>
           <a:prstGeom prst="rect">
             <a:avLst/>
@@ -2713,8 +2713,8 @@
         </p:nvSpPr>
         <p:spPr>
           <a:xfrm>
-            <a:off x="411480" y="5085087"/>
-            <a:ext cx="1920240" cy="292100"/>
+            <a:off x="411480" y="7627631"/>
+            <a:ext cx="1920240" cy="438150"/>
           </a:xfrm>
           <a:prstGeom prst="rect">
             <a:avLst/>
@@ -2724,7 +2724,7 @@
           <a:bodyPr vert="horz" lIns="67711" tIns="33854" rIns="67711" bIns="33854" rtlCol="0" anchor="ctr"/>
           <a:lstStyle>
             <a:lvl1pPr algn="l">
-              <a:defRPr sz="3402">
+              <a:defRPr sz="5103">
                 <a:solidFill>
                   <a:schemeClr val="tx1">
                     <a:tint val="75000"/>
@@ -2736,7 +2736,7 @@
           <a:p>
             <a:fld id="{01197F44-DB72-474A-9754-31703E05C006}" type="datetimeFigureOut">
               <a:rPr lang="en-US" smtClean="0"/>
-              <a:t>11/14/19</a:t>
+              <a:t>11/23/19</a:t>
             </a:fld>
             <a:endParaRPr lang="en-US"/>
           </a:p>
@@ -2754,8 +2754,8 @@
         </p:nvSpPr>
         <p:spPr>
           <a:xfrm>
-            <a:off x="2811781" y="5085087"/>
-            <a:ext cx="2606043" cy="292100"/>
+            <a:off x="2811783" y="7627631"/>
+            <a:ext cx="2606043" cy="438150"/>
           </a:xfrm>
           <a:prstGeom prst="rect">
             <a:avLst/>
@@ -2765,7 +2765,7 @@
           <a:bodyPr vert="horz" lIns="67711" tIns="33854" rIns="67711" bIns="33854" rtlCol="0" anchor="ctr"/>
           <a:lstStyle>
             <a:lvl1pPr algn="ctr">
-              <a:defRPr sz="3402">
+              <a:defRPr sz="5103">
                 <a:solidFill>
                   <a:schemeClr val="tx1">
                     <a:tint val="75000"/>
@@ -2791,8 +2791,8 @@
         </p:nvSpPr>
         <p:spPr>
           <a:xfrm>
-            <a:off x="5897880" y="5085087"/>
-            <a:ext cx="1920240" cy="292100"/>
+            <a:off x="5897880" y="7627631"/>
+            <a:ext cx="1920240" cy="438150"/>
           </a:xfrm>
           <a:prstGeom prst="rect">
             <a:avLst/>
@@ -2802,7 +2802,7 @@
           <a:bodyPr vert="horz" lIns="67711" tIns="33854" rIns="67711" bIns="33854" rtlCol="0" anchor="ctr"/>
           <a:lstStyle>
             <a:lvl1pPr algn="r">
-              <a:defRPr sz="3402">
+              <a:defRPr sz="5103">
                 <a:solidFill>
                   <a:schemeClr val="tx1">
                     <a:tint val="75000"/>
@@ -2843,12 +2843,12 @@
   </p:sldLayoutIdLst>
   <p:txStyles>
     <p:titleStyle>
-      <a:lvl1pPr algn="ctr" defTabSz="1439700" rtl="0" eaLnBrk="1" latinLnBrk="0" hangingPunct="1">
+      <a:lvl1pPr algn="ctr" defTabSz="2159496" rtl="0" eaLnBrk="1" latinLnBrk="0" hangingPunct="1">
         <a:spcBef>
           <a:spcPct val="0"/>
         </a:spcBef>
         <a:buNone/>
-        <a:defRPr sz="13607" kern="1200">
+        <a:defRPr sz="20410" kern="1200">
           <a:solidFill>
             <a:schemeClr val="tx1"/>
           </a:solidFill>
@@ -2859,13 +2859,13 @@
       </a:lvl1pPr>
     </p:titleStyle>
     <p:bodyStyle>
-      <a:lvl1pPr marL="1079773" indent="-1079773" algn="l" defTabSz="1439700" rtl="0" eaLnBrk="1" latinLnBrk="0" hangingPunct="1">
+      <a:lvl1pPr marL="1619619" indent="-1619619" algn="l" defTabSz="2159496" rtl="0" eaLnBrk="1" latinLnBrk="0" hangingPunct="1">
         <a:spcBef>
           <a:spcPct val="20000"/>
         </a:spcBef>
         <a:buFont typeface="Arial"/>
         <a:buChar char="•"/>
-        <a:defRPr sz="11059" kern="1200">
+        <a:defRPr sz="16588" kern="1200">
           <a:solidFill>
             <a:schemeClr val="tx1"/>
           </a:solidFill>
@@ -2874,13 +2874,13 @@
           <a:cs typeface="+mn-cs"/>
         </a:defRPr>
       </a:lvl1pPr>
-      <a:lvl2pPr marL="2339526" indent="-899811" algn="l" defTabSz="1439700" rtl="0" eaLnBrk="1" latinLnBrk="0" hangingPunct="1">
+      <a:lvl2pPr marL="3509201" indent="-1349683" algn="l" defTabSz="2159496" rtl="0" eaLnBrk="1" latinLnBrk="0" hangingPunct="1">
         <a:spcBef>
           <a:spcPct val="20000"/>
         </a:spcBef>
         <a:buFont typeface="Arial"/>
         <a:buChar char="–"/>
-        <a:defRPr sz="9355" kern="1200">
+        <a:defRPr sz="14032" kern="1200">
           <a:solidFill>
             <a:schemeClr val="tx1"/>
           </a:solidFill>
@@ -2889,13 +2889,13 @@
           <a:cs typeface="+mn-cs"/>
         </a:defRPr>
       </a:lvl2pPr>
-      <a:lvl3pPr marL="3599266" indent="-719843" algn="l" defTabSz="1439700" rtl="0" eaLnBrk="1" latinLnBrk="0" hangingPunct="1">
+      <a:lvl3pPr marL="5398764" indent="-1079738" algn="l" defTabSz="2159496" rtl="0" eaLnBrk="1" latinLnBrk="0" hangingPunct="1">
         <a:spcBef>
           <a:spcPct val="20000"/>
         </a:spcBef>
         <a:buFont typeface="Arial"/>
         <a:buChar char="•"/>
-        <a:defRPr sz="7654" kern="1200">
+        <a:defRPr sz="11481" kern="1200">
           <a:solidFill>
             <a:schemeClr val="tx1"/>
           </a:solidFill>
@@ -2904,13 +2904,13 @@
           <a:cs typeface="+mn-cs"/>
         </a:defRPr>
       </a:lvl3pPr>
-      <a:lvl4pPr marL="5038965" indent="-719843" algn="l" defTabSz="1439700" rtl="0" eaLnBrk="1" latinLnBrk="0" hangingPunct="1">
+      <a:lvl4pPr marL="7558259" indent="-1079738" algn="l" defTabSz="2159496" rtl="0" eaLnBrk="1" latinLnBrk="0" hangingPunct="1">
         <a:spcBef>
           <a:spcPct val="20000"/>
         </a:spcBef>
         <a:buFont typeface="Arial"/>
         <a:buChar char="–"/>
-        <a:defRPr sz="6807" kern="1200">
+        <a:defRPr sz="10211" kern="1200">
           <a:solidFill>
             <a:schemeClr val="tx1"/>
           </a:solidFill>
@@ -2919,13 +2919,13 @@
           <a:cs typeface="+mn-cs"/>
         </a:defRPr>
       </a:lvl4pPr>
-      <a:lvl5pPr marL="6478681" indent="-719843" algn="l" defTabSz="1439700" rtl="0" eaLnBrk="1" latinLnBrk="0" hangingPunct="1">
+      <a:lvl5pPr marL="9717778" indent="-1079738" algn="l" defTabSz="2159496" rtl="0" eaLnBrk="1" latinLnBrk="0" hangingPunct="1">
         <a:spcBef>
           <a:spcPct val="20000"/>
         </a:spcBef>
         <a:buFont typeface="Arial"/>
         <a:buChar char="»"/>
-        <a:defRPr sz="6807" kern="1200">
+        <a:defRPr sz="10211" kern="1200">
           <a:solidFill>
             <a:schemeClr val="tx1"/>
           </a:solidFill>
@@ -2934,13 +2934,13 @@
           <a:cs typeface="+mn-cs"/>
         </a:defRPr>
       </a:lvl5pPr>
-      <a:lvl6pPr marL="7918390" indent="-719843" algn="l" defTabSz="1439700" rtl="0" eaLnBrk="1" latinLnBrk="0" hangingPunct="1">
+      <a:lvl6pPr marL="11877288" indent="-1079738" algn="l" defTabSz="2159496" rtl="0" eaLnBrk="1" latinLnBrk="0" hangingPunct="1">
         <a:spcBef>
           <a:spcPct val="20000"/>
         </a:spcBef>
         <a:buFont typeface="Arial"/>
         <a:buChar char="•"/>
-        <a:defRPr sz="6807" kern="1200">
+        <a:defRPr sz="10211" kern="1200">
           <a:solidFill>
             <a:schemeClr val="tx1"/>
           </a:solidFill>
@@ -2949,13 +2949,13 @@
           <a:cs typeface="+mn-cs"/>
         </a:defRPr>
       </a:lvl6pPr>
-      <a:lvl7pPr marL="9358097" indent="-719843" algn="l" defTabSz="1439700" rtl="0" eaLnBrk="1" latinLnBrk="0" hangingPunct="1">
+      <a:lvl7pPr marL="14036795" indent="-1079738" algn="l" defTabSz="2159496" rtl="0" eaLnBrk="1" latinLnBrk="0" hangingPunct="1">
         <a:spcBef>
           <a:spcPct val="20000"/>
         </a:spcBef>
         <a:buFont typeface="Arial"/>
         <a:buChar char="•"/>
-        <a:defRPr sz="6807" kern="1200">
+        <a:defRPr sz="10211" kern="1200">
           <a:solidFill>
             <a:schemeClr val="tx1"/>
           </a:solidFill>
@@ -2964,13 +2964,13 @@
           <a:cs typeface="+mn-cs"/>
         </a:defRPr>
       </a:lvl7pPr>
-      <a:lvl8pPr marL="10797797" indent="-719843" algn="l" defTabSz="1439700" rtl="0" eaLnBrk="1" latinLnBrk="0" hangingPunct="1">
+      <a:lvl8pPr marL="16196291" indent="-1079738" algn="l" defTabSz="2159496" rtl="0" eaLnBrk="1" latinLnBrk="0" hangingPunct="1">
         <a:spcBef>
           <a:spcPct val="20000"/>
         </a:spcBef>
         <a:buFont typeface="Arial"/>
         <a:buChar char="•"/>
-        <a:defRPr sz="6807" kern="1200">
+        <a:defRPr sz="10211" kern="1200">
           <a:solidFill>
             <a:schemeClr val="tx1"/>
           </a:solidFill>
@@ -2979,13 +2979,13 @@
           <a:cs typeface="+mn-cs"/>
         </a:defRPr>
       </a:lvl8pPr>
-      <a:lvl9pPr marL="12237507" indent="-719843" algn="l" defTabSz="1439700" rtl="0" eaLnBrk="1" latinLnBrk="0" hangingPunct="1">
+      <a:lvl9pPr marL="18355802" indent="-1079738" algn="l" defTabSz="2159496" rtl="0" eaLnBrk="1" latinLnBrk="0" hangingPunct="1">
         <a:spcBef>
           <a:spcPct val="20000"/>
         </a:spcBef>
         <a:buFont typeface="Arial"/>
         <a:buChar char="•"/>
-        <a:defRPr sz="6807" kern="1200">
+        <a:defRPr sz="10211" kern="1200">
           <a:solidFill>
             <a:schemeClr val="tx1"/>
           </a:solidFill>
@@ -2999,8 +2999,8 @@
       <a:defPPr>
         <a:defRPr lang="en-US"/>
       </a:defPPr>
-      <a:lvl1pPr marL="0" algn="l" defTabSz="1439700" rtl="0" eaLnBrk="1" latinLnBrk="0" hangingPunct="1">
-        <a:defRPr sz="5953" kern="1200">
+      <a:lvl1pPr marL="0" algn="l" defTabSz="2159496" rtl="0" eaLnBrk="1" latinLnBrk="0" hangingPunct="1">
+        <a:defRPr sz="8929" kern="1200">
           <a:solidFill>
             <a:schemeClr val="tx1"/>
           </a:solidFill>
@@ -3009,8 +3009,8 @@
           <a:cs typeface="+mn-cs"/>
         </a:defRPr>
       </a:lvl1pPr>
-      <a:lvl2pPr marL="1439700" algn="l" defTabSz="1439700" rtl="0" eaLnBrk="1" latinLnBrk="0" hangingPunct="1">
-        <a:defRPr sz="5953" kern="1200">
+      <a:lvl2pPr marL="2159496" algn="l" defTabSz="2159496" rtl="0" eaLnBrk="1" latinLnBrk="0" hangingPunct="1">
+        <a:defRPr sz="8929" kern="1200">
           <a:solidFill>
             <a:schemeClr val="tx1"/>
           </a:solidFill>
@@ -3019,8 +3019,8 @@
           <a:cs typeface="+mn-cs"/>
         </a:defRPr>
       </a:lvl2pPr>
-      <a:lvl3pPr marL="2879414" algn="l" defTabSz="1439700" rtl="0" eaLnBrk="1" latinLnBrk="0" hangingPunct="1">
-        <a:defRPr sz="5953" kern="1200">
+      <a:lvl3pPr marL="4319013" algn="l" defTabSz="2159496" rtl="0" eaLnBrk="1" latinLnBrk="0" hangingPunct="1">
+        <a:defRPr sz="8929" kern="1200">
           <a:solidFill>
             <a:schemeClr val="tx1"/>
           </a:solidFill>
@@ -3029,8 +3029,8 @@
           <a:cs typeface="+mn-cs"/>
         </a:defRPr>
       </a:lvl3pPr>
-      <a:lvl4pPr marL="4319114" algn="l" defTabSz="1439700" rtl="0" eaLnBrk="1" latinLnBrk="0" hangingPunct="1">
-        <a:defRPr sz="5953" kern="1200">
+      <a:lvl4pPr marL="6478509" algn="l" defTabSz="2159496" rtl="0" eaLnBrk="1" latinLnBrk="0" hangingPunct="1">
+        <a:defRPr sz="8929" kern="1200">
           <a:solidFill>
             <a:schemeClr val="tx1"/>
           </a:solidFill>
@@ -3039,8 +3039,8 @@
           <a:cs typeface="+mn-cs"/>
         </a:defRPr>
       </a:lvl4pPr>
-      <a:lvl5pPr marL="5758813" algn="l" defTabSz="1439700" rtl="0" eaLnBrk="1" latinLnBrk="0" hangingPunct="1">
-        <a:defRPr sz="5953" kern="1200">
+      <a:lvl5pPr marL="8638003" algn="l" defTabSz="2159496" rtl="0" eaLnBrk="1" latinLnBrk="0" hangingPunct="1">
+        <a:defRPr sz="8929" kern="1200">
           <a:solidFill>
             <a:schemeClr val="tx1"/>
           </a:solidFill>
@@ -3049,8 +3049,8 @@
           <a:cs typeface="+mn-cs"/>
         </a:defRPr>
       </a:lvl5pPr>
-      <a:lvl6pPr marL="7198531" algn="l" defTabSz="1439700" rtl="0" eaLnBrk="1" latinLnBrk="0" hangingPunct="1">
-        <a:defRPr sz="5953" kern="1200">
+      <a:lvl6pPr marL="10797526" algn="l" defTabSz="2159496" rtl="0" eaLnBrk="1" latinLnBrk="0" hangingPunct="1">
+        <a:defRPr sz="8929" kern="1200">
           <a:solidFill>
             <a:schemeClr val="tx1"/>
           </a:solidFill>
@@ -3059,8 +3059,8 @@
           <a:cs typeface="+mn-cs"/>
         </a:defRPr>
       </a:lvl6pPr>
-      <a:lvl7pPr marL="8638231" algn="l" defTabSz="1439700" rtl="0" eaLnBrk="1" latinLnBrk="0" hangingPunct="1">
-        <a:defRPr sz="5953" kern="1200">
+      <a:lvl7pPr marL="12957022" algn="l" defTabSz="2159496" rtl="0" eaLnBrk="1" latinLnBrk="0" hangingPunct="1">
+        <a:defRPr sz="8929" kern="1200">
           <a:solidFill>
             <a:schemeClr val="tx1"/>
           </a:solidFill>
@@ -3069,8 +3069,8 @@
           <a:cs typeface="+mn-cs"/>
         </a:defRPr>
       </a:lvl7pPr>
-      <a:lvl8pPr marL="10077944" algn="l" defTabSz="1439700" rtl="0" eaLnBrk="1" latinLnBrk="0" hangingPunct="1">
-        <a:defRPr sz="5953" kern="1200">
+      <a:lvl8pPr marL="15116538" algn="l" defTabSz="2159496" rtl="0" eaLnBrk="1" latinLnBrk="0" hangingPunct="1">
+        <a:defRPr sz="8929" kern="1200">
           <a:solidFill>
             <a:schemeClr val="tx1"/>
           </a:solidFill>
@@ -3079,8 +3079,8 @@
           <a:cs typeface="+mn-cs"/>
         </a:defRPr>
       </a:lvl8pPr>
-      <a:lvl9pPr marL="11517656" algn="l" defTabSz="1439700" rtl="0" eaLnBrk="1" latinLnBrk="0" hangingPunct="1">
-        <a:defRPr sz="5953" kern="1200">
+      <a:lvl9pPr marL="17276052" algn="l" defTabSz="2159496" rtl="0" eaLnBrk="1" latinLnBrk="0" hangingPunct="1">
+        <a:defRPr sz="8929" kern="1200">
           <a:solidFill>
             <a:schemeClr val="tx1"/>
           </a:solidFill>
@@ -3111,16 +3111,88 @@
           <a:chExt cx="0" cy="0"/>
         </a:xfrm>
       </p:grpSpPr>
-      <p:sp>
-        <p:nvSpPr>
-          <p:cNvPr id="207" name="Rectangle 206"/>
+      <p:cxnSp>
+        <p:nvCxnSpPr>
+          <p:cNvPr id="156" name="Straight Connector 155"/>
+          <p:cNvCxnSpPr/>
+          <p:nvPr/>
+        </p:nvCxnSpPr>
+        <p:spPr>
+          <a:xfrm>
+            <a:off x="3728393" y="6477109"/>
+            <a:ext cx="1476079" cy="703577"/>
+          </a:xfrm>
+          <a:prstGeom prst="line">
+            <a:avLst/>
+          </a:prstGeom>
+          <a:ln>
+            <a:solidFill>
+              <a:srgbClr val="000000"/>
+            </a:solidFill>
+            <a:tailEnd type="triangle"/>
+          </a:ln>
+        </p:spPr>
+        <p:style>
+          <a:lnRef idx="1">
+            <a:schemeClr val="accent1"/>
+          </a:lnRef>
+          <a:fillRef idx="0">
+            <a:schemeClr val="accent1"/>
+          </a:fillRef>
+          <a:effectRef idx="0">
+            <a:schemeClr val="accent1"/>
+          </a:effectRef>
+          <a:fontRef idx="minor">
+            <a:schemeClr val="tx1"/>
+          </a:fontRef>
+        </p:style>
+      </p:cxnSp>
+      <p:cxnSp>
+        <p:nvCxnSpPr>
+          <p:cNvPr id="148" name="Straight Connector 147"/>
+          <p:cNvCxnSpPr/>
+          <p:nvPr/>
+        </p:nvCxnSpPr>
+        <p:spPr>
+          <a:xfrm>
+            <a:off x="1345167" y="5505713"/>
+            <a:ext cx="6050986" cy="0"/>
+          </a:xfrm>
+          <a:prstGeom prst="line">
+            <a:avLst/>
+          </a:prstGeom>
+          <a:ln w="12700">
+            <a:solidFill>
+              <a:schemeClr val="tx1"/>
+            </a:solidFill>
+          </a:ln>
+          <a:effectLst/>
+        </p:spPr>
+        <p:style>
+          <a:lnRef idx="2">
+            <a:schemeClr val="accent1"/>
+          </a:lnRef>
+          <a:fillRef idx="0">
+            <a:schemeClr val="accent1"/>
+          </a:fillRef>
+          <a:effectRef idx="1">
+            <a:schemeClr val="accent1"/>
+          </a:effectRef>
+          <a:fontRef idx="minor">
+            <a:schemeClr val="tx1"/>
+          </a:fontRef>
+        </p:style>
+      </p:cxnSp>
+      <p:sp>
+        <p:nvSpPr>
+          <p:cNvPr id="74" name="Rectangle 73"/>
           <p:cNvSpPr/>
           <p:nvPr/>
         </p:nvSpPr>
         <p:spPr>
           <a:xfrm>
-            <a:off x="925314" y="165902"/>
-            <a:ext cx="6227512" cy="338554"/>
+            <a:off x="936599" y="991168"/>
+            <a:ext cx="3204327" cy="584775"/>
           </a:xfrm>
           <a:prstGeom prst="rect">
             <a:avLst/>
@@ -3169,13 +3241,13 @@
       </p:sp>
       <p:grpSp>
         <p:nvGrpSpPr>
-          <p:cNvPr id="208" name="Group 207"/>
+          <p:cNvPr id="75" name="Group 74"/>
           <p:cNvGrpSpPr/>
           <p:nvPr/>
         </p:nvGrpSpPr>
         <p:grpSpPr>
           <a:xfrm>
-            <a:off x="161408" y="144580"/>
+            <a:off x="172693" y="1105283"/>
             <a:ext cx="668867" cy="325713"/>
             <a:chOff x="246728" y="489707"/>
             <a:chExt cx="668867" cy="325713"/>
@@ -3183,7 +3255,7 @@
         </p:grpSpPr>
         <p:sp>
           <p:nvSpPr>
-            <p:cNvPr id="209" name="Pentagon 208"/>
+            <p:cNvPr id="76" name="Pentagon 75"/>
             <p:cNvSpPr/>
             <p:nvPr/>
           </p:nvSpPr>
@@ -3230,7 +3302,7 @@
         </p:sp>
         <p:cxnSp>
           <p:nvCxnSpPr>
-            <p:cNvPr id="210" name="Straight Connector 209"/>
+            <p:cNvPr id="77" name="Straight Connector 76"/>
             <p:cNvCxnSpPr/>
             <p:nvPr/>
           </p:nvCxnSpPr>
@@ -3266,7 +3338,7 @@
         </p:cxnSp>
         <p:sp>
           <p:nvSpPr>
-            <p:cNvPr id="211" name="Connector 210"/>
+            <p:cNvPr id="78" name="Connector 77"/>
             <p:cNvSpPr/>
             <p:nvPr/>
           </p:nvSpPr>
@@ -3314,13 +3386,13 @@
       </p:grpSp>
       <p:cxnSp>
         <p:nvCxnSpPr>
-          <p:cNvPr id="212" name="Straight Connector 211"/>
+          <p:cNvPr id="79" name="Straight Connector 78"/>
           <p:cNvCxnSpPr/>
           <p:nvPr/>
         </p:nvCxnSpPr>
         <p:spPr>
           <a:xfrm>
-            <a:off x="6340623" y="1525098"/>
+            <a:off x="3783605" y="5700956"/>
             <a:ext cx="0" cy="841248"/>
           </a:xfrm>
           <a:prstGeom prst="line">
@@ -3348,16 +3420,212 @@
           </a:fontRef>
         </p:style>
       </p:cxnSp>
+      <p:pic>
+        <p:nvPicPr>
+          <p:cNvPr id="85" name="Picture 84"/>
+          <p:cNvPicPr>
+            <a:picLocks noChangeAspect="1"/>
+          </p:cNvPicPr>
+          <p:nvPr/>
+        </p:nvPicPr>
+        <p:blipFill>
+          <a:blip r:embed="rId2"/>
+          <a:stretch>
+            <a:fillRect/>
+          </a:stretch>
+        </p:blipFill>
+        <p:spPr>
+          <a:xfrm>
+            <a:off x="4229915" y="1083496"/>
+            <a:ext cx="711200" cy="342900"/>
+          </a:xfrm>
+          <a:prstGeom prst="rect">
+            <a:avLst/>
+          </a:prstGeom>
+        </p:spPr>
+      </p:pic>
+      <p:sp>
+        <p:nvSpPr>
+          <p:cNvPr id="86" name="Rectangle 85"/>
+          <p:cNvSpPr/>
+          <p:nvPr/>
+        </p:nvSpPr>
+        <p:spPr>
+          <a:xfrm>
+            <a:off x="4961324" y="1050808"/>
+            <a:ext cx="3313152" cy="338554"/>
+          </a:xfrm>
+          <a:prstGeom prst="rect">
+            <a:avLst/>
+          </a:prstGeom>
+        </p:spPr>
+        <p:txBody>
+          <a:bodyPr wrap="square">
+            <a:spAutoFit/>
+          </a:bodyPr>
+          <a:lstStyle/>
+          <a:p>
+            <a:r>
+              <a:rPr lang="en-US" sz="1600" dirty="0"/>
+              <a:t>- </a:t>
+            </a:r>
+            <a:r>
+              <a:rPr lang="en-US" sz="1600" dirty="0" err="1" smtClean="0"/>
+              <a:t>Mg_chelatase</a:t>
+            </a:r>
+            <a:r>
+              <a:rPr lang="en-US" sz="1600" dirty="0" smtClean="0"/>
+              <a:t> domain (</a:t>
+            </a:r>
+            <a:r>
+              <a:rPr lang="is-IS" sz="1600" dirty="0"/>
+              <a:t>PF01078.21</a:t>
+            </a:r>
+            <a:r>
+              <a:rPr lang="en-US" sz="1600" dirty="0" smtClean="0"/>
+              <a:t>)</a:t>
+            </a:r>
+          </a:p>
+        </p:txBody>
+      </p:sp>
+      <p:pic>
+        <p:nvPicPr>
+          <p:cNvPr id="87" name="Picture 86"/>
+          <p:cNvPicPr>
+            <a:picLocks noChangeAspect="1"/>
+          </p:cNvPicPr>
+          <p:nvPr/>
+        </p:nvPicPr>
+        <p:blipFill>
+          <a:blip r:embed="rId3"/>
+          <a:stretch>
+            <a:fillRect/>
+          </a:stretch>
+        </p:blipFill>
+        <p:spPr>
+          <a:xfrm>
+            <a:off x="4221695" y="100777"/>
+            <a:ext cx="546100" cy="317500"/>
+          </a:xfrm>
+          <a:prstGeom prst="rect">
+            <a:avLst/>
+          </a:prstGeom>
+        </p:spPr>
+      </p:pic>
+      <p:sp>
+        <p:nvSpPr>
+          <p:cNvPr id="88" name="Rectangle 87"/>
+          <p:cNvSpPr/>
+          <p:nvPr/>
+        </p:nvSpPr>
+        <p:spPr>
+          <a:xfrm>
+            <a:off x="4928827" y="63041"/>
+            <a:ext cx="3313152" cy="338554"/>
+          </a:xfrm>
+          <a:prstGeom prst="rect">
+            <a:avLst/>
+          </a:prstGeom>
+        </p:spPr>
+        <p:txBody>
+          <a:bodyPr wrap="square">
+            <a:spAutoFit/>
+          </a:bodyPr>
+          <a:lstStyle/>
+          <a:p>
+            <a:r>
+              <a:rPr lang="en-US" sz="1600" dirty="0"/>
+              <a:t>- AAA_lid_2 </a:t>
+            </a:r>
+            <a:r>
+              <a:rPr lang="en-US" sz="1600" dirty="0" smtClean="0"/>
+              <a:t>domain (</a:t>
+            </a:r>
+            <a:r>
+              <a:rPr lang="nb-NO" sz="1600" dirty="0"/>
+              <a:t>PF17863.1</a:t>
+            </a:r>
+            <a:r>
+              <a:rPr lang="en-US" sz="1600" dirty="0" smtClean="0"/>
+              <a:t>)</a:t>
+            </a:r>
+          </a:p>
+        </p:txBody>
+      </p:sp>
+      <p:pic>
+        <p:nvPicPr>
+          <p:cNvPr id="89" name="Picture 88"/>
+          <p:cNvPicPr>
+            <a:picLocks noChangeAspect="1"/>
+          </p:cNvPicPr>
+          <p:nvPr/>
+        </p:nvPicPr>
+        <p:blipFill>
+          <a:blip r:embed="rId4"/>
+          <a:stretch>
+            <a:fillRect/>
+          </a:stretch>
+        </p:blipFill>
+        <p:spPr>
+          <a:xfrm>
+            <a:off x="4212024" y="590194"/>
+            <a:ext cx="749300" cy="330200"/>
+          </a:xfrm>
+          <a:prstGeom prst="rect">
+            <a:avLst/>
+          </a:prstGeom>
+        </p:spPr>
+      </p:pic>
+      <p:sp>
+        <p:nvSpPr>
+          <p:cNvPr id="90" name="Rectangle 89"/>
+          <p:cNvSpPr/>
+          <p:nvPr/>
+        </p:nvSpPr>
+        <p:spPr>
+          <a:xfrm>
+            <a:off x="4928827" y="581840"/>
+            <a:ext cx="3313152" cy="338554"/>
+          </a:xfrm>
+          <a:prstGeom prst="rect">
+            <a:avLst/>
+          </a:prstGeom>
+        </p:spPr>
+        <p:txBody>
+          <a:bodyPr wrap="square">
+            <a:spAutoFit/>
+          </a:bodyPr>
+          <a:lstStyle/>
+          <a:p>
+            <a:r>
+              <a:rPr lang="en-US" sz="1600" dirty="0"/>
+              <a:t>- VWA_2 </a:t>
+            </a:r>
+            <a:r>
+              <a:rPr lang="en-US" sz="1600" dirty="0" smtClean="0"/>
+              <a:t>domain (</a:t>
+            </a:r>
+            <a:r>
+              <a:rPr lang="hr-HR" sz="1600" dirty="0"/>
+              <a:t>PF13519.6</a:t>
+            </a:r>
+            <a:r>
+              <a:rPr lang="en-US" sz="1600" dirty="0" smtClean="0"/>
+              <a:t>)</a:t>
+            </a:r>
+          </a:p>
+        </p:txBody>
+      </p:sp>
       <p:cxnSp>
         <p:nvCxnSpPr>
-          <p:cNvPr id="219" name="Straight Connector 218"/>
+          <p:cNvPr id="94" name="Straight Connector 93"/>
           <p:cNvCxnSpPr/>
           <p:nvPr/>
         </p:nvCxnSpPr>
         <p:spPr>
           <a:xfrm flipH="1">
-            <a:off x="2112264" y="2183357"/>
-            <a:ext cx="3793325" cy="714328"/>
+            <a:off x="2327363" y="6477109"/>
+            <a:ext cx="1476079" cy="703577"/>
           </a:xfrm>
           <a:prstGeom prst="line">
             <a:avLst/>
@@ -3367,6 +3635,760 @@
               <a:srgbClr val="000000"/>
             </a:solidFill>
             <a:tailEnd type="triangle"/>
+          </a:ln>
+        </p:spPr>
+        <p:style>
+          <a:lnRef idx="1">
+            <a:schemeClr val="accent1"/>
+          </a:lnRef>
+          <a:fillRef idx="0">
+            <a:schemeClr val="accent1"/>
+          </a:fillRef>
+          <a:effectRef idx="0">
+            <a:schemeClr val="accent1"/>
+          </a:effectRef>
+          <a:fontRef idx="minor">
+            <a:schemeClr val="tx1"/>
+          </a:fontRef>
+        </p:style>
+      </p:cxnSp>
+      <p:sp>
+        <p:nvSpPr>
+          <p:cNvPr id="95" name="Rectangle 94"/>
+          <p:cNvSpPr/>
+          <p:nvPr/>
+        </p:nvSpPr>
+        <p:spPr>
+          <a:xfrm>
+            <a:off x="2187660" y="6728167"/>
+            <a:ext cx="486915" cy="338554"/>
+          </a:xfrm>
+          <a:prstGeom prst="rect">
+            <a:avLst/>
+          </a:prstGeom>
+        </p:spPr>
+        <p:txBody>
+          <a:bodyPr wrap="square">
+            <a:spAutoFit/>
+          </a:bodyPr>
+          <a:lstStyle/>
+          <a:p>
+            <a:pPr algn="ctr"/>
+            <a:r>
+              <a:rPr lang="en-US" sz="1600" b="1" dirty="0" smtClean="0"/>
+              <a:t>No</a:t>
+            </a:r>
+            <a:endParaRPr lang="en-US" sz="1600" b="1" dirty="0"/>
+          </a:p>
+        </p:txBody>
+      </p:sp>
+      <p:pic>
+        <p:nvPicPr>
+          <p:cNvPr id="96" name="Picture 95"/>
+          <p:cNvPicPr>
+            <a:picLocks noChangeAspect="1"/>
+          </p:cNvPicPr>
+          <p:nvPr/>
+        </p:nvPicPr>
+        <p:blipFill>
+          <a:blip r:embed="rId5"/>
+          <a:stretch>
+            <a:fillRect/>
+          </a:stretch>
+        </p:blipFill>
+        <p:spPr>
+          <a:xfrm>
+            <a:off x="3688058" y="7211104"/>
+            <a:ext cx="4401842" cy="292608"/>
+          </a:xfrm>
+          <a:prstGeom prst="rect">
+            <a:avLst/>
+          </a:prstGeom>
+        </p:spPr>
+      </p:pic>
+      <p:sp>
+        <p:nvSpPr>
+          <p:cNvPr id="98" name="Rectangle 97"/>
+          <p:cNvSpPr/>
+          <p:nvPr/>
+        </p:nvSpPr>
+        <p:spPr>
+          <a:xfrm>
+            <a:off x="4208122" y="7513078"/>
+            <a:ext cx="2862806" cy="584775"/>
+          </a:xfrm>
+          <a:prstGeom prst="rect">
+            <a:avLst/>
+          </a:prstGeom>
+        </p:spPr>
+        <p:txBody>
+          <a:bodyPr wrap="square">
+            <a:spAutoFit/>
+          </a:bodyPr>
+          <a:lstStyle/>
+          <a:p>
+            <a:pPr algn="ctr"/>
+            <a:r>
+              <a:rPr lang="en-US" sz="1600" dirty="0" smtClean="0"/>
+              <a:t>Long product </a:t>
+            </a:r>
+            <a:r>
+              <a:rPr lang="en-US" sz="1600" dirty="0">
+                <a:cs typeface="Courier New"/>
+              </a:rPr>
+              <a:t>(</a:t>
+            </a:r>
+            <a:r>
+              <a:rPr lang="fi-FI" sz="1600" dirty="0">
+                <a:cs typeface="Courier New"/>
+              </a:rPr>
+              <a:t>679 aa</a:t>
+            </a:r>
+            <a:r>
+              <a:rPr lang="en-US" sz="1600" dirty="0" smtClean="0">
+                <a:cs typeface="Courier New"/>
+              </a:rPr>
+              <a:t>)</a:t>
+            </a:r>
+          </a:p>
+          <a:p>
+            <a:pPr algn="ctr"/>
+            <a:r>
+              <a:rPr lang="en-US" sz="1600" dirty="0" smtClean="0"/>
+              <a:t>is similar to the </a:t>
+            </a:r>
+            <a:r>
+              <a:rPr lang="en-US" sz="1600" dirty="0" err="1" smtClean="0"/>
+              <a:t>ChlD</a:t>
+            </a:r>
+            <a:r>
+              <a:rPr lang="en-US" sz="1600" dirty="0" smtClean="0"/>
+              <a:t> protein</a:t>
+            </a:r>
+          </a:p>
+        </p:txBody>
+      </p:sp>
+      <p:sp>
+        <p:nvSpPr>
+          <p:cNvPr id="99" name="Rectangle 98"/>
+          <p:cNvSpPr/>
+          <p:nvPr/>
+        </p:nvSpPr>
+        <p:spPr>
+          <a:xfrm>
+            <a:off x="470299" y="7494346"/>
+            <a:ext cx="2467326" cy="584775"/>
+          </a:xfrm>
+          <a:prstGeom prst="rect">
+            <a:avLst/>
+          </a:prstGeom>
+        </p:spPr>
+        <p:txBody>
+          <a:bodyPr wrap="square">
+            <a:spAutoFit/>
+          </a:bodyPr>
+          <a:lstStyle/>
+          <a:p>
+            <a:pPr algn="ctr"/>
+            <a:r>
+              <a:rPr lang="en-US" sz="1600" dirty="0" smtClean="0"/>
+              <a:t>Short product </a:t>
+            </a:r>
+            <a:r>
+              <a:rPr lang="en-US" sz="1600" dirty="0">
+                <a:cs typeface="Courier New"/>
+              </a:rPr>
+              <a:t>(</a:t>
+            </a:r>
+            <a:r>
+              <a:rPr lang="is-IS" sz="1600" dirty="0">
+                <a:cs typeface="Courier New"/>
+              </a:rPr>
+              <a:t>362 aa</a:t>
+            </a:r>
+            <a:r>
+              <a:rPr lang="en-US" sz="1600" dirty="0" smtClean="0">
+                <a:cs typeface="Courier New"/>
+              </a:rPr>
+              <a:t>)</a:t>
+            </a:r>
+          </a:p>
+          <a:p>
+            <a:pPr algn="ctr"/>
+            <a:r>
+              <a:rPr lang="en-US" sz="1600" dirty="0" smtClean="0"/>
+              <a:t>is similar to the </a:t>
+            </a:r>
+            <a:r>
+              <a:rPr lang="en-US" sz="1600" dirty="0" err="1" smtClean="0"/>
+              <a:t>ChlI</a:t>
+            </a:r>
+            <a:r>
+              <a:rPr lang="en-US" sz="1600" dirty="0" smtClean="0"/>
+              <a:t> protein</a:t>
+            </a:r>
+          </a:p>
+        </p:txBody>
+      </p:sp>
+      <p:pic>
+        <p:nvPicPr>
+          <p:cNvPr id="100" name="Picture 99"/>
+          <p:cNvPicPr>
+            <a:picLocks noChangeAspect="1"/>
+          </p:cNvPicPr>
+          <p:nvPr/>
+        </p:nvPicPr>
+        <p:blipFill>
+          <a:blip r:embed="rId6"/>
+          <a:stretch>
+            <a:fillRect/>
+          </a:stretch>
+        </p:blipFill>
+        <p:spPr>
+          <a:xfrm>
+            <a:off x="907113" y="3310107"/>
+            <a:ext cx="2353586" cy="292608"/>
+          </a:xfrm>
+          <a:prstGeom prst="rect">
+            <a:avLst/>
+          </a:prstGeom>
+        </p:spPr>
+      </p:pic>
+      <p:pic>
+        <p:nvPicPr>
+          <p:cNvPr id="101" name="Picture 100"/>
+          <p:cNvPicPr>
+            <a:picLocks noChangeAspect="1"/>
+          </p:cNvPicPr>
+          <p:nvPr/>
+        </p:nvPicPr>
+        <p:blipFill>
+          <a:blip r:embed="rId7"/>
+          <a:stretch>
+            <a:fillRect/>
+          </a:stretch>
+        </p:blipFill>
+        <p:spPr>
+          <a:xfrm>
+            <a:off x="3740723" y="3310107"/>
+            <a:ext cx="4389120" cy="292608"/>
+          </a:xfrm>
+          <a:prstGeom prst="rect">
+            <a:avLst/>
+          </a:prstGeom>
+        </p:spPr>
+      </p:pic>
+      <p:sp>
+        <p:nvSpPr>
+          <p:cNvPr id="102" name="Rectangle 101"/>
+          <p:cNvSpPr/>
+          <p:nvPr/>
+        </p:nvSpPr>
+        <p:spPr>
+          <a:xfrm>
+            <a:off x="1423922" y="1708126"/>
+            <a:ext cx="5350392" cy="338554"/>
+          </a:xfrm>
+          <a:prstGeom prst="rect">
+            <a:avLst/>
+          </a:prstGeom>
+        </p:spPr>
+        <p:txBody>
+          <a:bodyPr wrap="square">
+            <a:spAutoFit/>
+          </a:bodyPr>
+          <a:lstStyle/>
+          <a:p>
+            <a:pPr algn="ctr"/>
+            <a:r>
+              <a:rPr lang="en-US" sz="1600" b="1" i="1" dirty="0" err="1"/>
+              <a:t>Synechocystis</a:t>
+            </a:r>
+            <a:r>
+              <a:rPr lang="en-US" sz="1600" b="1" i="1" dirty="0"/>
+              <a:t> sp. PCC 6803</a:t>
+            </a:r>
+            <a:r>
+              <a:rPr lang="en-US" sz="1600" b="1" dirty="0"/>
+              <a:t> </a:t>
+            </a:r>
+            <a:r>
+              <a:rPr lang="en-US" sz="1600" b="1" dirty="0" smtClean="0"/>
+              <a:t>(photosynthetic cyanobacteria)</a:t>
+            </a:r>
+          </a:p>
+        </p:txBody>
+      </p:sp>
+      <p:cxnSp>
+        <p:nvCxnSpPr>
+          <p:cNvPr id="103" name="Straight Connector 102"/>
+          <p:cNvCxnSpPr/>
+          <p:nvPr/>
+        </p:nvCxnSpPr>
+        <p:spPr>
+          <a:xfrm>
+            <a:off x="108337" y="1711078"/>
+            <a:ext cx="7981563" cy="27550"/>
+          </a:xfrm>
+          <a:prstGeom prst="line">
+            <a:avLst/>
+          </a:prstGeom>
+          <a:ln>
+            <a:solidFill>
+              <a:schemeClr val="bg1">
+                <a:lumMod val="50000"/>
+              </a:schemeClr>
+            </a:solidFill>
+            <a:tailEnd type="none"/>
+          </a:ln>
+        </p:spPr>
+        <p:style>
+          <a:lnRef idx="1">
+            <a:schemeClr val="accent1"/>
+          </a:lnRef>
+          <a:fillRef idx="0">
+            <a:schemeClr val="accent1"/>
+          </a:fillRef>
+          <a:effectRef idx="0">
+            <a:schemeClr val="accent1"/>
+          </a:effectRef>
+          <a:fontRef idx="minor">
+            <a:schemeClr val="tx1"/>
+          </a:fontRef>
+        </p:style>
+      </p:cxnSp>
+      <p:sp>
+        <p:nvSpPr>
+          <p:cNvPr id="104" name="Rectangle 103"/>
+          <p:cNvSpPr/>
+          <p:nvPr/>
+        </p:nvSpPr>
+        <p:spPr>
+          <a:xfrm>
+            <a:off x="4072105" y="3602715"/>
+            <a:ext cx="3558510" cy="584775"/>
+          </a:xfrm>
+          <a:prstGeom prst="rect">
+            <a:avLst/>
+          </a:prstGeom>
+        </p:spPr>
+        <p:txBody>
+          <a:bodyPr wrap="square">
+            <a:spAutoFit/>
+          </a:bodyPr>
+          <a:lstStyle/>
+          <a:p>
+            <a:pPr algn="ctr"/>
+            <a:r>
+              <a:rPr lang="fi-FI" sz="1600" dirty="0"/>
+              <a:t>BAA16787.1 </a:t>
+            </a:r>
+            <a:r>
+              <a:rPr lang="mr-IN" sz="1600" dirty="0"/>
+              <a:t>–</a:t>
+            </a:r>
+            <a:r>
+              <a:rPr lang="fi-FI" sz="1600" dirty="0"/>
+              <a:t> </a:t>
+            </a:r>
+            <a:r>
+              <a:rPr lang="en-US" sz="1600" dirty="0" err="1"/>
+              <a:t>ChlD</a:t>
+            </a:r>
+            <a:r>
+              <a:rPr lang="en-US" sz="1600" dirty="0"/>
+              <a:t> </a:t>
+            </a:r>
+            <a:r>
+              <a:rPr lang="en-US" sz="1600" dirty="0" smtClean="0"/>
+              <a:t>protein</a:t>
+            </a:r>
+          </a:p>
+          <a:p>
+            <a:pPr algn="ctr"/>
+            <a:r>
+              <a:rPr lang="en-US" sz="1600" dirty="0" smtClean="0"/>
+              <a:t>(medium </a:t>
+            </a:r>
+            <a:r>
+              <a:rPr lang="en-US" sz="1600" dirty="0"/>
+              <a:t>Mg-</a:t>
+            </a:r>
+            <a:r>
+              <a:rPr lang="en-US" sz="1600" dirty="0" err="1"/>
+              <a:t>chelatase</a:t>
+            </a:r>
+            <a:r>
+              <a:rPr lang="en-US" sz="1600" dirty="0"/>
+              <a:t> </a:t>
+            </a:r>
+            <a:r>
+              <a:rPr lang="en-US" sz="1600" dirty="0" smtClean="0"/>
+              <a:t>subunit, </a:t>
+            </a:r>
+            <a:r>
+              <a:rPr lang="nl-NL" sz="1600" dirty="0" smtClean="0"/>
+              <a:t>676 </a:t>
+            </a:r>
+            <a:r>
+              <a:rPr lang="nl-NL" sz="1600" dirty="0" err="1"/>
+              <a:t>aa</a:t>
+            </a:r>
+            <a:r>
+              <a:rPr lang="en-US" sz="1600" dirty="0"/>
+              <a:t>)</a:t>
+            </a:r>
+            <a:endParaRPr lang="en-US" sz="1600" dirty="0" smtClean="0"/>
+          </a:p>
+        </p:txBody>
+      </p:sp>
+      <p:sp>
+        <p:nvSpPr>
+          <p:cNvPr id="105" name="Rectangle 104"/>
+          <p:cNvSpPr/>
+          <p:nvPr/>
+        </p:nvSpPr>
+        <p:spPr>
+          <a:xfrm>
+            <a:off x="287535" y="3602715"/>
+            <a:ext cx="3558510" cy="584775"/>
+          </a:xfrm>
+          <a:prstGeom prst="rect">
+            <a:avLst/>
+          </a:prstGeom>
+        </p:spPr>
+        <p:txBody>
+          <a:bodyPr wrap="square">
+            <a:spAutoFit/>
+          </a:bodyPr>
+          <a:lstStyle/>
+          <a:p>
+            <a:pPr algn="ctr"/>
+            <a:r>
+              <a:rPr lang="en-US" sz="1600" dirty="0"/>
+              <a:t>BAA17166.1 </a:t>
+            </a:r>
+            <a:r>
+              <a:rPr lang="mr-IN" sz="1600" dirty="0"/>
+              <a:t>–</a:t>
+            </a:r>
+            <a:r>
+              <a:rPr lang="en-US" sz="1600" dirty="0"/>
+              <a:t> </a:t>
+            </a:r>
+            <a:r>
+              <a:rPr lang="en-US" sz="1600" dirty="0" err="1"/>
+              <a:t>ChlI</a:t>
+            </a:r>
+            <a:r>
+              <a:rPr lang="en-US" sz="1600" dirty="0"/>
+              <a:t> </a:t>
+            </a:r>
+            <a:r>
+              <a:rPr lang="en-US" sz="1600" dirty="0" smtClean="0"/>
+              <a:t>protein</a:t>
+            </a:r>
+          </a:p>
+          <a:p>
+            <a:pPr algn="ctr"/>
+            <a:r>
+              <a:rPr lang="en-US" sz="1600" dirty="0" smtClean="0"/>
+              <a:t>(small </a:t>
+            </a:r>
+            <a:r>
+              <a:rPr lang="en-US" sz="1600" dirty="0"/>
+              <a:t>Mg-</a:t>
+            </a:r>
+            <a:r>
+              <a:rPr lang="en-US" sz="1600" dirty="0" err="1"/>
+              <a:t>chelatase</a:t>
+            </a:r>
+            <a:r>
+              <a:rPr lang="en-US" sz="1600" dirty="0"/>
+              <a:t> </a:t>
+            </a:r>
+            <a:r>
+              <a:rPr lang="en-US" sz="1600" dirty="0" smtClean="0"/>
+              <a:t>subunit, </a:t>
+            </a:r>
+            <a:r>
+              <a:rPr lang="nl-NL" sz="1600" dirty="0" smtClean="0"/>
+              <a:t>357 </a:t>
+            </a:r>
+            <a:r>
+              <a:rPr lang="nl-NL" sz="1600" dirty="0" err="1"/>
+              <a:t>aa</a:t>
+            </a:r>
+            <a:r>
+              <a:rPr lang="en-US" sz="1600" dirty="0"/>
+              <a:t>)</a:t>
+            </a:r>
+            <a:endParaRPr lang="en-US" sz="1600" dirty="0" smtClean="0"/>
+          </a:p>
+        </p:txBody>
+      </p:sp>
+      <p:sp>
+        <p:nvSpPr>
+          <p:cNvPr id="106" name="Rectangle 105"/>
+          <p:cNvSpPr/>
+          <p:nvPr/>
+        </p:nvSpPr>
+        <p:spPr>
+          <a:xfrm>
+            <a:off x="4018189" y="5145200"/>
+            <a:ext cx="1246157" cy="338554"/>
+          </a:xfrm>
+          <a:prstGeom prst="rect">
+            <a:avLst/>
+          </a:prstGeom>
+        </p:spPr>
+        <p:txBody>
+          <a:bodyPr wrap="square">
+            <a:spAutoFit/>
+          </a:bodyPr>
+          <a:lstStyle/>
+          <a:p>
+            <a:pPr algn="ctr"/>
+            <a:r>
+              <a:rPr lang="en-US" sz="1600" dirty="0" smtClean="0"/>
+              <a:t>fs-</a:t>
+            </a:r>
+            <a:r>
+              <a:rPr lang="en-US" sz="1600" i="1" dirty="0" err="1" smtClean="0"/>
+              <a:t>chlD</a:t>
+            </a:r>
+            <a:r>
+              <a:rPr lang="en-US" sz="1600" dirty="0" smtClean="0"/>
+              <a:t> gene</a:t>
+            </a:r>
+            <a:endParaRPr lang="en-US" sz="1600" i="1" dirty="0" smtClean="0"/>
+          </a:p>
+        </p:txBody>
+      </p:sp>
+      <p:sp>
+        <p:nvSpPr>
+          <p:cNvPr id="107" name="Pentagon 106"/>
+          <p:cNvSpPr/>
+          <p:nvPr/>
+        </p:nvSpPr>
+        <p:spPr>
+          <a:xfrm>
+            <a:off x="172693" y="149443"/>
+            <a:ext cx="236549" cy="266808"/>
+          </a:xfrm>
+          <a:prstGeom prst="homePlate">
+            <a:avLst/>
+          </a:prstGeom>
+          <a:solidFill>
+            <a:srgbClr val="92D050"/>
+          </a:solidFill>
+          <a:ln>
+            <a:solidFill>
+              <a:schemeClr val="tx1"/>
+            </a:solidFill>
+          </a:ln>
+          <a:effectLst/>
+        </p:spPr>
+        <p:style>
+          <a:lnRef idx="1">
+            <a:schemeClr val="accent1"/>
+          </a:lnRef>
+          <a:fillRef idx="3">
+            <a:schemeClr val="accent1"/>
+          </a:fillRef>
+          <a:effectRef idx="2">
+            <a:schemeClr val="accent1"/>
+          </a:effectRef>
+          <a:fontRef idx="minor">
+            <a:schemeClr val="lt1"/>
+          </a:fontRef>
+        </p:style>
+        <p:txBody>
+          <a:bodyPr rtlCol="0" anchor="ctr"/>
+          <a:lstStyle/>
+          <a:p>
+            <a:pPr algn="ctr"/>
+            <a:endParaRPr lang="en-US"/>
+          </a:p>
+        </p:txBody>
+      </p:sp>
+      <p:sp>
+        <p:nvSpPr>
+          <p:cNvPr id="108" name="Rectangle 107"/>
+          <p:cNvSpPr/>
+          <p:nvPr/>
+        </p:nvSpPr>
+        <p:spPr>
+          <a:xfrm>
+            <a:off x="936599" y="77697"/>
+            <a:ext cx="3204327" cy="338554"/>
+          </a:xfrm>
+          <a:prstGeom prst="rect">
+            <a:avLst/>
+          </a:prstGeom>
+        </p:spPr>
+        <p:txBody>
+          <a:bodyPr wrap="square">
+            <a:spAutoFit/>
+          </a:bodyPr>
+          <a:lstStyle/>
+          <a:p>
+            <a:r>
+              <a:rPr lang="en-US" sz="1600" dirty="0" smtClean="0"/>
+              <a:t>- small subunit gene (</a:t>
+            </a:r>
+            <a:r>
+              <a:rPr lang="en-US" sz="1600" i="1" dirty="0" err="1" smtClean="0"/>
+              <a:t>chlI</a:t>
+            </a:r>
+            <a:r>
+              <a:rPr lang="en-US" sz="1600" dirty="0" smtClean="0"/>
+              <a:t>)</a:t>
+            </a:r>
+          </a:p>
+        </p:txBody>
+      </p:sp>
+      <p:sp>
+        <p:nvSpPr>
+          <p:cNvPr id="109" name="Pentagon 108"/>
+          <p:cNvSpPr/>
+          <p:nvPr/>
+        </p:nvSpPr>
+        <p:spPr>
+          <a:xfrm>
+            <a:off x="172693" y="612379"/>
+            <a:ext cx="668867" cy="266808"/>
+          </a:xfrm>
+          <a:prstGeom prst="homePlate">
+            <a:avLst/>
+          </a:prstGeom>
+          <a:solidFill>
+            <a:srgbClr val="92D050"/>
+          </a:solidFill>
+          <a:ln>
+            <a:solidFill>
+              <a:schemeClr val="tx1"/>
+            </a:solidFill>
+          </a:ln>
+          <a:effectLst/>
+        </p:spPr>
+        <p:style>
+          <a:lnRef idx="1">
+            <a:schemeClr val="accent1"/>
+          </a:lnRef>
+          <a:fillRef idx="3">
+            <a:schemeClr val="accent1"/>
+          </a:fillRef>
+          <a:effectRef idx="2">
+            <a:schemeClr val="accent1"/>
+          </a:effectRef>
+          <a:fontRef idx="minor">
+            <a:schemeClr val="lt1"/>
+          </a:fontRef>
+        </p:style>
+        <p:txBody>
+          <a:bodyPr rtlCol="0" anchor="ctr"/>
+          <a:lstStyle/>
+          <a:p>
+            <a:pPr algn="ctr"/>
+            <a:endParaRPr lang="en-US"/>
+          </a:p>
+        </p:txBody>
+      </p:sp>
+      <p:sp>
+        <p:nvSpPr>
+          <p:cNvPr id="111" name="Rectangle 110"/>
+          <p:cNvSpPr/>
+          <p:nvPr/>
+        </p:nvSpPr>
+        <p:spPr>
+          <a:xfrm>
+            <a:off x="936599" y="576506"/>
+            <a:ext cx="3204327" cy="338554"/>
+          </a:xfrm>
+          <a:prstGeom prst="rect">
+            <a:avLst/>
+          </a:prstGeom>
+        </p:spPr>
+        <p:txBody>
+          <a:bodyPr wrap="square">
+            <a:spAutoFit/>
+          </a:bodyPr>
+          <a:lstStyle/>
+          <a:p>
+            <a:r>
+              <a:rPr lang="en-US" sz="1600" dirty="0" smtClean="0"/>
+              <a:t>- medium subunit gene (</a:t>
+            </a:r>
+            <a:r>
+              <a:rPr lang="en-US" sz="1600" i="1" dirty="0" err="1" smtClean="0"/>
+              <a:t>chlD</a:t>
+            </a:r>
+            <a:r>
+              <a:rPr lang="en-US" sz="1600" dirty="0" smtClean="0"/>
+              <a:t>)</a:t>
+            </a:r>
+          </a:p>
+        </p:txBody>
+      </p:sp>
+      <p:sp>
+        <p:nvSpPr>
+          <p:cNvPr id="113" name="Rectangle 112"/>
+          <p:cNvSpPr/>
+          <p:nvPr/>
+        </p:nvSpPr>
+        <p:spPr>
+          <a:xfrm>
+            <a:off x="1229816" y="4794623"/>
+            <a:ext cx="5350392" cy="338554"/>
+          </a:xfrm>
+          <a:prstGeom prst="rect">
+            <a:avLst/>
+          </a:prstGeom>
+        </p:spPr>
+        <p:txBody>
+          <a:bodyPr wrap="square">
+            <a:spAutoFit/>
+          </a:bodyPr>
+          <a:lstStyle/>
+          <a:p>
+            <a:pPr algn="ctr"/>
+            <a:r>
+              <a:rPr lang="en-US" sz="1600" b="1" i="1" dirty="0" err="1"/>
+              <a:t>Methanocaldococcus</a:t>
+            </a:r>
+            <a:r>
+              <a:rPr lang="en-US" sz="1600" b="1" i="1" dirty="0"/>
+              <a:t> sp. FS406-22</a:t>
+            </a:r>
+            <a:r>
+              <a:rPr lang="en-US" sz="1600" b="1" dirty="0" smtClean="0"/>
+              <a:t> (archaea)</a:t>
+            </a:r>
+          </a:p>
+        </p:txBody>
+      </p:sp>
+      <p:cxnSp>
+        <p:nvCxnSpPr>
+          <p:cNvPr id="114" name="Straight Connector 113"/>
+          <p:cNvCxnSpPr/>
+          <p:nvPr/>
+        </p:nvCxnSpPr>
+        <p:spPr>
+          <a:xfrm>
+            <a:off x="108337" y="4770822"/>
+            <a:ext cx="7981563" cy="27550"/>
+          </a:xfrm>
+          <a:prstGeom prst="line">
+            <a:avLst/>
+          </a:prstGeom>
+          <a:ln>
+            <a:solidFill>
+              <a:schemeClr val="bg1">
+                <a:lumMod val="50000"/>
+              </a:schemeClr>
+            </a:solidFill>
+            <a:tailEnd type="none"/>
           </a:ln>
         </p:spPr>
         <p:style>
@@ -3386,34 +4408,34 @@
       </p:cxnSp>
       <p:grpSp>
         <p:nvGrpSpPr>
-          <p:cNvPr id="5" name="Group 4"/>
+          <p:cNvPr id="115" name="Group 114"/>
           <p:cNvGrpSpPr/>
           <p:nvPr/>
         </p:nvGrpSpPr>
         <p:grpSpPr>
           <a:xfrm>
-            <a:off x="5229765" y="1790029"/>
-            <a:ext cx="2312534" cy="617422"/>
-            <a:chOff x="5161478" y="2444579"/>
-            <a:chExt cx="2312534" cy="617422"/>
+            <a:off x="3472059" y="5326147"/>
+            <a:ext cx="668867" cy="325713"/>
+            <a:chOff x="246728" y="489707"/>
+            <a:chExt cx="668867" cy="325713"/>
           </a:xfrm>
         </p:grpSpPr>
         <p:sp>
           <p:nvSpPr>
-            <p:cNvPr id="233" name="Oval 232"/>
+            <p:cNvPr id="116" name="Pentagon 115"/>
             <p:cNvSpPr/>
             <p:nvPr/>
           </p:nvSpPr>
           <p:spPr>
             <a:xfrm>
-              <a:off x="5288730" y="2444579"/>
-              <a:ext cx="2066693" cy="617422"/>
+              <a:off x="246728" y="548612"/>
+              <a:ext cx="668867" cy="266808"/>
             </a:xfrm>
-            <a:prstGeom prst="ellipse">
+            <a:prstGeom prst="homePlate">
               <a:avLst/>
             </a:prstGeom>
             <a:solidFill>
-              <a:schemeClr val="bg1"/>
+              <a:srgbClr val="92D050"/>
             </a:solidFill>
             <a:ln>
               <a:solidFill>
@@ -3441,347 +4463,111 @@
             <a:lstStyle/>
             <a:p>
               <a:pPr algn="ctr"/>
-              <a:endParaRPr lang="en-US" sz="1600" dirty="0">
-                <a:solidFill>
-                  <a:schemeClr val="tx1"/>
-                </a:solidFill>
-              </a:endParaRPr>
+              <a:endParaRPr lang="en-US"/>
             </a:p>
           </p:txBody>
         </p:sp>
+        <p:cxnSp>
+          <p:nvCxnSpPr>
+            <p:cNvPr id="117" name="Straight Connector 116"/>
+            <p:cNvCxnSpPr/>
+            <p:nvPr/>
+          </p:nvCxnSpPr>
+          <p:spPr>
+            <a:xfrm>
+              <a:off x="531057" y="548612"/>
+              <a:ext cx="0" cy="266808"/>
+            </a:xfrm>
+            <a:prstGeom prst="line">
+              <a:avLst/>
+            </a:prstGeom>
+            <a:ln w="76200">
+              <a:solidFill>
+                <a:srgbClr val="FF0000"/>
+              </a:solidFill>
+            </a:ln>
+            <a:effectLst/>
+          </p:spPr>
+          <p:style>
+            <a:lnRef idx="2">
+              <a:schemeClr val="accent1"/>
+            </a:lnRef>
+            <a:fillRef idx="0">
+              <a:schemeClr val="accent1"/>
+            </a:fillRef>
+            <a:effectRef idx="1">
+              <a:schemeClr val="accent1"/>
+            </a:effectRef>
+            <a:fontRef idx="minor">
+              <a:schemeClr val="tx1"/>
+            </a:fontRef>
+          </p:style>
+        </p:cxnSp>
         <p:sp>
           <p:nvSpPr>
-            <p:cNvPr id="234" name="Rectangle 233"/>
+            <p:cNvPr id="118" name="Connector 117"/>
             <p:cNvSpPr/>
             <p:nvPr/>
           </p:nvSpPr>
           <p:spPr>
             <a:xfrm>
-              <a:off x="5161478" y="2455845"/>
-              <a:ext cx="2312534" cy="584775"/>
+              <a:off x="578110" y="489707"/>
+              <a:ext cx="145216" cy="145216"/>
             </a:xfrm>
-            <a:prstGeom prst="rect">
+            <a:prstGeom prst="flowChartConnector">
               <a:avLst/>
             </a:prstGeom>
+            <a:solidFill>
+              <a:srgbClr val="FF0000"/>
+            </a:solidFill>
+            <a:ln>
+              <a:solidFill>
+                <a:schemeClr val="tx1"/>
+              </a:solidFill>
+            </a:ln>
+            <a:effectLst/>
           </p:spPr>
+          <p:style>
+            <a:lnRef idx="1">
+              <a:schemeClr val="accent1"/>
+            </a:lnRef>
+            <a:fillRef idx="3">
+              <a:schemeClr val="accent1"/>
+            </a:fillRef>
+            <a:effectRef idx="2">
+              <a:schemeClr val="accent1"/>
+            </a:effectRef>
+            <a:fontRef idx="minor">
+              <a:schemeClr val="lt1"/>
+            </a:fontRef>
+          </p:style>
           <p:txBody>
-            <a:bodyPr wrap="square">
-              <a:spAutoFit/>
-            </a:bodyPr>
+            <a:bodyPr rtlCol="0" anchor="ctr"/>
             <a:lstStyle/>
             <a:p>
               <a:pPr algn="ctr"/>
-              <a:r>
-                <a:rPr lang="de-DE" sz="1600" dirty="0" smtClean="0"/>
-                <a:t>Translation </a:t>
-              </a:r>
-              <a:r>
-                <a:rPr lang="de-DE" sz="1600" dirty="0" err="1" smtClean="0"/>
-                <a:t>with</a:t>
-              </a:r>
-              <a:r>
-                <a:rPr lang="de-DE" sz="1600" dirty="0" smtClean="0"/>
-                <a:t> </a:t>
-              </a:r>
-              <a:r>
-                <a:rPr lang="de-DE" sz="1600" dirty="0" err="1" smtClean="0"/>
-                <a:t>frameshifting</a:t>
-              </a:r>
-              <a:endParaRPr lang="en-US" sz="1600" dirty="0" smtClean="0"/>
+              <a:endParaRPr lang="en-US"/>
             </a:p>
           </p:txBody>
         </p:sp>
       </p:grpSp>
-      <p:sp>
-        <p:nvSpPr>
-          <p:cNvPr id="235" name="Rectangle 234"/>
-          <p:cNvSpPr/>
-          <p:nvPr/>
-        </p:nvSpPr>
-        <p:spPr>
-          <a:xfrm>
-            <a:off x="2062478" y="2480087"/>
-            <a:ext cx="486915" cy="338554"/>
-          </a:xfrm>
-          <a:prstGeom prst="rect">
-            <a:avLst/>
-          </a:prstGeom>
-        </p:spPr>
-        <p:txBody>
-          <a:bodyPr wrap="square">
-            <a:spAutoFit/>
-          </a:bodyPr>
-          <a:lstStyle/>
-          <a:p>
-            <a:pPr algn="ctr"/>
-            <a:r>
-              <a:rPr lang="en-US" sz="1600" b="1" dirty="0" smtClean="0"/>
-              <a:t>Yes</a:t>
-            </a:r>
-            <a:endParaRPr lang="en-US" sz="1600" b="1" dirty="0"/>
-          </a:p>
-        </p:txBody>
-      </p:sp>
-      <p:pic>
-        <p:nvPicPr>
-          <p:cNvPr id="2" name="Picture 1"/>
-          <p:cNvPicPr>
-            <a:picLocks noChangeAspect="1"/>
-          </p:cNvPicPr>
-          <p:nvPr/>
-        </p:nvPicPr>
-        <p:blipFill>
-          <a:blip r:embed="rId2"/>
-          <a:stretch>
-            <a:fillRect/>
-          </a:stretch>
-        </p:blipFill>
-        <p:spPr>
-          <a:xfrm>
-            <a:off x="161408" y="589612"/>
-            <a:ext cx="711200" cy="342900"/>
-          </a:xfrm>
-          <a:prstGeom prst="rect">
-            <a:avLst/>
-          </a:prstGeom>
-        </p:spPr>
-      </p:pic>
-      <p:sp>
-        <p:nvSpPr>
-          <p:cNvPr id="266" name="Rectangle 265"/>
-          <p:cNvSpPr/>
-          <p:nvPr/>
-        </p:nvSpPr>
-        <p:spPr>
-          <a:xfrm>
-            <a:off x="892817" y="556924"/>
-            <a:ext cx="3313152" cy="338554"/>
-          </a:xfrm>
-          <a:prstGeom prst="rect">
-            <a:avLst/>
-          </a:prstGeom>
-        </p:spPr>
-        <p:txBody>
-          <a:bodyPr wrap="square">
-            <a:spAutoFit/>
-          </a:bodyPr>
-          <a:lstStyle/>
-          <a:p>
-            <a:r>
-              <a:rPr lang="en-US" sz="1600" dirty="0"/>
-              <a:t>- </a:t>
-            </a:r>
-            <a:r>
-              <a:rPr lang="en-US" sz="1600" dirty="0" err="1" smtClean="0"/>
-              <a:t>Mg_chelatase</a:t>
-            </a:r>
-            <a:r>
-              <a:rPr lang="en-US" sz="1600" dirty="0" smtClean="0"/>
-              <a:t> domain (</a:t>
-            </a:r>
-            <a:r>
-              <a:rPr lang="is-IS" sz="1600" dirty="0"/>
-              <a:t>PF01078.21</a:t>
-            </a:r>
-            <a:r>
-              <a:rPr lang="en-US" sz="1600" dirty="0" smtClean="0"/>
-              <a:t>)</a:t>
-            </a:r>
-          </a:p>
-        </p:txBody>
-      </p:sp>
-      <p:pic>
-        <p:nvPicPr>
-          <p:cNvPr id="3" name="Picture 2"/>
-          <p:cNvPicPr>
-            <a:picLocks noChangeAspect="1"/>
-          </p:cNvPicPr>
-          <p:nvPr/>
-        </p:nvPicPr>
-        <p:blipFill>
-          <a:blip r:embed="rId3"/>
-          <a:stretch>
-            <a:fillRect/>
-          </a:stretch>
-        </p:blipFill>
-        <p:spPr>
-          <a:xfrm>
-            <a:off x="277614" y="1021706"/>
-            <a:ext cx="546100" cy="317500"/>
-          </a:xfrm>
-          <a:prstGeom prst="rect">
-            <a:avLst/>
-          </a:prstGeom>
-        </p:spPr>
-      </p:pic>
-      <p:sp>
-        <p:nvSpPr>
-          <p:cNvPr id="267" name="Rectangle 266"/>
-          <p:cNvSpPr/>
-          <p:nvPr/>
-        </p:nvSpPr>
-        <p:spPr>
-          <a:xfrm>
-            <a:off x="892817" y="983970"/>
-            <a:ext cx="3313152" cy="338554"/>
-          </a:xfrm>
-          <a:prstGeom prst="rect">
-            <a:avLst/>
-          </a:prstGeom>
-        </p:spPr>
-        <p:txBody>
-          <a:bodyPr wrap="square">
-            <a:spAutoFit/>
-          </a:bodyPr>
-          <a:lstStyle/>
-          <a:p>
-            <a:r>
-              <a:rPr lang="en-US" sz="1600" dirty="0"/>
-              <a:t>- AAA_lid_2 </a:t>
-            </a:r>
-            <a:r>
-              <a:rPr lang="en-US" sz="1600" dirty="0" smtClean="0"/>
-              <a:t>domain (</a:t>
-            </a:r>
-            <a:r>
-              <a:rPr lang="nb-NO" sz="1600" dirty="0"/>
-              <a:t>PF17863.1</a:t>
-            </a:r>
-            <a:r>
-              <a:rPr lang="en-US" sz="1600" dirty="0" smtClean="0"/>
-              <a:t>)</a:t>
-            </a:r>
-          </a:p>
-        </p:txBody>
-      </p:sp>
-      <p:pic>
-        <p:nvPicPr>
-          <p:cNvPr id="4" name="Picture 3"/>
-          <p:cNvPicPr>
-            <a:picLocks noChangeAspect="1"/>
-          </p:cNvPicPr>
-          <p:nvPr/>
-        </p:nvPicPr>
-        <p:blipFill>
-          <a:blip r:embed="rId4"/>
-          <a:stretch>
-            <a:fillRect/>
-          </a:stretch>
-        </p:blipFill>
-        <p:spPr>
-          <a:xfrm>
-            <a:off x="176014" y="1423342"/>
-            <a:ext cx="749300" cy="330200"/>
-          </a:xfrm>
-          <a:prstGeom prst="rect">
-            <a:avLst/>
-          </a:prstGeom>
-        </p:spPr>
-      </p:pic>
-      <p:sp>
-        <p:nvSpPr>
-          <p:cNvPr id="268" name="Rectangle 267"/>
-          <p:cNvSpPr/>
-          <p:nvPr/>
-        </p:nvSpPr>
-        <p:spPr>
-          <a:xfrm>
-            <a:off x="892817" y="1414988"/>
-            <a:ext cx="3313152" cy="338554"/>
-          </a:xfrm>
-          <a:prstGeom prst="rect">
-            <a:avLst/>
-          </a:prstGeom>
-        </p:spPr>
-        <p:txBody>
-          <a:bodyPr wrap="square">
-            <a:spAutoFit/>
-          </a:bodyPr>
-          <a:lstStyle/>
-          <a:p>
-            <a:r>
-              <a:rPr lang="en-US" sz="1600" dirty="0"/>
-              <a:t>- VWA_2 </a:t>
-            </a:r>
-            <a:r>
-              <a:rPr lang="en-US" sz="1600" dirty="0" smtClean="0"/>
-              <a:t>domain (</a:t>
-            </a:r>
-            <a:r>
-              <a:rPr lang="hr-HR" sz="1600" dirty="0"/>
-              <a:t>PF13519.6</a:t>
-            </a:r>
-            <a:r>
-              <a:rPr lang="en-US" sz="1600" dirty="0" smtClean="0"/>
-              <a:t>)</a:t>
-            </a:r>
-          </a:p>
-        </p:txBody>
-      </p:sp>
-      <p:sp>
-        <p:nvSpPr>
-          <p:cNvPr id="270" name="Pentagon 269"/>
-          <p:cNvSpPr/>
-          <p:nvPr/>
-        </p:nvSpPr>
-        <p:spPr>
-          <a:xfrm>
-            <a:off x="5004401" y="1211386"/>
-            <a:ext cx="2815846" cy="266808"/>
-          </a:xfrm>
-          <a:prstGeom prst="homePlate">
-            <a:avLst/>
-          </a:prstGeom>
-          <a:solidFill>
-            <a:srgbClr val="92D050"/>
-          </a:solidFill>
-          <a:ln>
-            <a:solidFill>
-              <a:schemeClr val="tx1"/>
-            </a:solidFill>
-          </a:ln>
-          <a:effectLst/>
-        </p:spPr>
-        <p:style>
-          <a:lnRef idx="1">
-            <a:schemeClr val="accent1"/>
-          </a:lnRef>
-          <a:fillRef idx="3">
-            <a:schemeClr val="accent1"/>
-          </a:fillRef>
-          <a:effectRef idx="2">
-            <a:schemeClr val="accent1"/>
-          </a:effectRef>
-          <a:fontRef idx="minor">
-            <a:schemeClr val="lt1"/>
-          </a:fontRef>
-        </p:style>
-        <p:txBody>
-          <a:bodyPr rtlCol="0" anchor="ctr"/>
-          <a:lstStyle/>
-          <a:p>
-            <a:pPr algn="ctr"/>
-            <a:endParaRPr lang="en-US"/>
-          </a:p>
-        </p:txBody>
-      </p:sp>
       <p:cxnSp>
         <p:nvCxnSpPr>
-          <p:cNvPr id="271" name="Straight Connector 270"/>
+          <p:cNvPr id="121" name="Straight Connector 120"/>
           <p:cNvCxnSpPr/>
           <p:nvPr/>
         </p:nvCxnSpPr>
         <p:spPr>
           <a:xfrm>
-            <a:off x="6704516" y="1217174"/>
-            <a:ext cx="0" cy="266808"/>
+            <a:off x="1345167" y="2405804"/>
+            <a:ext cx="6050986" cy="0"/>
           </a:xfrm>
           <a:prstGeom prst="line">
             <a:avLst/>
           </a:prstGeom>
-          <a:ln w="76200">
+          <a:ln w="12700">
             <a:solidFill>
-              <a:srgbClr val="FF0000"/>
+              <a:schemeClr val="tx1"/>
             </a:solidFill>
           </a:ln>
           <a:effectLst/>
@@ -3803,20 +4589,20 @@
       </p:cxnSp>
       <p:sp>
         <p:nvSpPr>
-          <p:cNvPr id="272" name="Connector 271"/>
+          <p:cNvPr id="140" name="Pentagon 139"/>
           <p:cNvSpPr/>
           <p:nvPr/>
         </p:nvSpPr>
         <p:spPr>
           <a:xfrm>
-            <a:off x="6737127" y="1152481"/>
-            <a:ext cx="145216" cy="145216"/>
-          </a:xfrm>
-          <a:prstGeom prst="flowChartConnector">
+            <a:off x="2312844" y="2272400"/>
+            <a:ext cx="236549" cy="266808"/>
+          </a:xfrm>
+          <a:prstGeom prst="homePlate">
             <a:avLst/>
           </a:prstGeom>
           <a:solidFill>
-            <a:srgbClr val="FF0000"/>
+            <a:srgbClr val="92D050"/>
           </a:solidFill>
           <a:ln>
             <a:solidFill>
@@ -3848,16 +4634,131 @@
           </a:p>
         </p:txBody>
       </p:sp>
+      <p:sp>
+        <p:nvSpPr>
+          <p:cNvPr id="141" name="Pentagon 140"/>
+          <p:cNvSpPr/>
+          <p:nvPr/>
+        </p:nvSpPr>
+        <p:spPr>
+          <a:xfrm>
+            <a:off x="5229765" y="2276055"/>
+            <a:ext cx="668867" cy="266808"/>
+          </a:xfrm>
+          <a:prstGeom prst="homePlate">
+            <a:avLst/>
+          </a:prstGeom>
+          <a:solidFill>
+            <a:srgbClr val="92D050"/>
+          </a:solidFill>
+          <a:ln>
+            <a:solidFill>
+              <a:schemeClr val="tx1"/>
+            </a:solidFill>
+          </a:ln>
+          <a:effectLst/>
+        </p:spPr>
+        <p:style>
+          <a:lnRef idx="1">
+            <a:schemeClr val="accent1"/>
+          </a:lnRef>
+          <a:fillRef idx="3">
+            <a:schemeClr val="accent1"/>
+          </a:fillRef>
+          <a:effectRef idx="2">
+            <a:schemeClr val="accent1"/>
+          </a:effectRef>
+          <a:fontRef idx="minor">
+            <a:schemeClr val="lt1"/>
+          </a:fontRef>
+        </p:style>
+        <p:txBody>
+          <a:bodyPr rtlCol="0" anchor="ctr"/>
+          <a:lstStyle/>
+          <a:p>
+            <a:pPr algn="ctr"/>
+            <a:endParaRPr lang="en-US"/>
+          </a:p>
+        </p:txBody>
+      </p:sp>
+      <p:sp>
+        <p:nvSpPr>
+          <p:cNvPr id="142" name="Rectangle 141"/>
+          <p:cNvSpPr/>
+          <p:nvPr/>
+        </p:nvSpPr>
+        <p:spPr>
+          <a:xfrm>
+            <a:off x="2414411" y="2071944"/>
+            <a:ext cx="1102659" cy="338554"/>
+          </a:xfrm>
+          <a:prstGeom prst="rect">
+            <a:avLst/>
+          </a:prstGeom>
+        </p:spPr>
+        <p:txBody>
+          <a:bodyPr wrap="square">
+            <a:spAutoFit/>
+          </a:bodyPr>
+          <a:lstStyle/>
+          <a:p>
+            <a:pPr algn="ctr"/>
+            <a:r>
+              <a:rPr lang="en-US" sz="1600" i="1" dirty="0" err="1" smtClean="0"/>
+              <a:t>chlI</a:t>
+            </a:r>
+            <a:r>
+              <a:rPr lang="en-US" sz="1600" dirty="0" smtClean="0"/>
+              <a:t> gene</a:t>
+            </a:r>
+            <a:endParaRPr lang="en-US" sz="1600" i="1" dirty="0" smtClean="0"/>
+          </a:p>
+        </p:txBody>
+      </p:sp>
+      <p:sp>
+        <p:nvSpPr>
+          <p:cNvPr id="143" name="Rectangle 142"/>
+          <p:cNvSpPr/>
+          <p:nvPr/>
+        </p:nvSpPr>
+        <p:spPr>
+          <a:xfrm>
+            <a:off x="5785420" y="2073126"/>
+            <a:ext cx="1102659" cy="338554"/>
+          </a:xfrm>
+          <a:prstGeom prst="rect">
+            <a:avLst/>
+          </a:prstGeom>
+        </p:spPr>
+        <p:txBody>
+          <a:bodyPr wrap="square">
+            <a:spAutoFit/>
+          </a:bodyPr>
+          <a:lstStyle/>
+          <a:p>
+            <a:pPr algn="ctr"/>
+            <a:r>
+              <a:rPr lang="en-US" sz="1600" i="1" dirty="0" err="1" smtClean="0"/>
+              <a:t>chlD</a:t>
+            </a:r>
+            <a:r>
+              <a:rPr lang="en-US" sz="1600" dirty="0" smtClean="0"/>
+              <a:t> gene</a:t>
+            </a:r>
+            <a:endParaRPr lang="en-US" sz="1600" i="1" dirty="0" smtClean="0"/>
+          </a:p>
+        </p:txBody>
+      </p:sp>
       <p:cxnSp>
         <p:nvCxnSpPr>
-          <p:cNvPr id="280" name="Straight Connector 279"/>
+          <p:cNvPr id="144" name="Straight Connector 143"/>
           <p:cNvCxnSpPr/>
           <p:nvPr/>
         </p:nvCxnSpPr>
         <p:spPr>
           <a:xfrm>
-            <a:off x="6336751" y="2393419"/>
-            <a:ext cx="3872" cy="511890"/>
+            <a:off x="2423657" y="2615816"/>
+            <a:ext cx="0" cy="584650"/>
           </a:xfrm>
           <a:prstGeom prst="line">
             <a:avLst/>
@@ -3884,319 +4785,25 @@
           </a:fontRef>
         </p:style>
       </p:cxnSp>
-      <p:sp>
-        <p:nvSpPr>
-          <p:cNvPr id="283" name="Rectangle 282"/>
-          <p:cNvSpPr/>
-          <p:nvPr/>
-        </p:nvSpPr>
-        <p:spPr>
-          <a:xfrm>
-            <a:off x="6336751" y="2480087"/>
-            <a:ext cx="486915" cy="338554"/>
-          </a:xfrm>
-          <a:prstGeom prst="rect">
-            <a:avLst/>
-          </a:prstGeom>
-        </p:spPr>
-        <p:txBody>
-          <a:bodyPr wrap="square">
-            <a:spAutoFit/>
-          </a:bodyPr>
-          <a:lstStyle/>
-          <a:p>
-            <a:pPr algn="ctr"/>
-            <a:r>
-              <a:rPr lang="en-US" sz="1600" b="1" dirty="0" smtClean="0"/>
-              <a:t>No</a:t>
-            </a:r>
-            <a:endParaRPr lang="en-US" sz="1600" b="1" dirty="0"/>
-          </a:p>
-        </p:txBody>
-      </p:sp>
-      <p:pic>
-        <p:nvPicPr>
-          <p:cNvPr id="284" name="Picture 283"/>
-          <p:cNvPicPr>
-            <a:picLocks noChangeAspect="1"/>
-          </p:cNvPicPr>
-          <p:nvPr/>
-        </p:nvPicPr>
-        <p:blipFill>
-          <a:blip r:embed="rId5"/>
-          <a:stretch>
-            <a:fillRect/>
-          </a:stretch>
-        </p:blipFill>
-        <p:spPr>
-          <a:xfrm>
-            <a:off x="105014" y="3001425"/>
-            <a:ext cx="4401842" cy="292608"/>
-          </a:xfrm>
-          <a:prstGeom prst="rect">
-            <a:avLst/>
-          </a:prstGeom>
-        </p:spPr>
-      </p:pic>
-      <p:pic>
-        <p:nvPicPr>
-          <p:cNvPr id="285" name="Picture 284"/>
-          <p:cNvPicPr>
-            <a:picLocks noChangeAspect="1"/>
-          </p:cNvPicPr>
-          <p:nvPr/>
-        </p:nvPicPr>
-        <p:blipFill>
-          <a:blip r:embed="rId6"/>
-          <a:stretch>
-            <a:fillRect/>
-          </a:stretch>
-        </p:blipFill>
-        <p:spPr>
-          <a:xfrm>
-            <a:off x="5004401" y="3010791"/>
-            <a:ext cx="2391752" cy="292608"/>
-          </a:xfrm>
-          <a:prstGeom prst="rect">
-            <a:avLst/>
-          </a:prstGeom>
-        </p:spPr>
-      </p:pic>
-      <p:sp>
-        <p:nvSpPr>
-          <p:cNvPr id="288" name="Rectangle 287"/>
-          <p:cNvSpPr/>
-          <p:nvPr/>
-        </p:nvSpPr>
-        <p:spPr>
-          <a:xfrm>
-            <a:off x="625078" y="3303399"/>
-            <a:ext cx="2862806" cy="584775"/>
-          </a:xfrm>
-          <a:prstGeom prst="rect">
-            <a:avLst/>
-          </a:prstGeom>
-        </p:spPr>
-        <p:txBody>
-          <a:bodyPr wrap="square">
-            <a:spAutoFit/>
-          </a:bodyPr>
-          <a:lstStyle/>
-          <a:p>
-            <a:pPr algn="ctr"/>
-            <a:r>
-              <a:rPr lang="en-US" sz="1600" dirty="0" smtClean="0"/>
-              <a:t>Long product </a:t>
-            </a:r>
-            <a:r>
-              <a:rPr lang="en-US" sz="1600" dirty="0">
-                <a:cs typeface="Courier New"/>
-              </a:rPr>
-              <a:t>(</a:t>
-            </a:r>
-            <a:r>
-              <a:rPr lang="fi-FI" sz="1600" dirty="0">
-                <a:cs typeface="Courier New"/>
-              </a:rPr>
-              <a:t>679 aa</a:t>
-            </a:r>
-            <a:r>
-              <a:rPr lang="en-US" sz="1600" dirty="0">
-                <a:cs typeface="Courier New"/>
-              </a:rPr>
-              <a:t>)</a:t>
-            </a:r>
-            <a:r>
-              <a:rPr lang="en-US" sz="1600" dirty="0" smtClean="0"/>
-              <a:t> is similar to the </a:t>
-            </a:r>
-            <a:r>
-              <a:rPr lang="en-US" sz="1600" dirty="0" err="1" smtClean="0"/>
-              <a:t>ChlD</a:t>
-            </a:r>
-            <a:r>
-              <a:rPr lang="en-US" sz="1600" dirty="0" smtClean="0"/>
-              <a:t> protein</a:t>
-            </a:r>
-          </a:p>
-        </p:txBody>
-      </p:sp>
-      <p:sp>
-        <p:nvSpPr>
-          <p:cNvPr id="289" name="Rectangle 288"/>
-          <p:cNvSpPr/>
-          <p:nvPr/>
-        </p:nvSpPr>
-        <p:spPr>
-          <a:xfrm>
-            <a:off x="4928827" y="3294033"/>
-            <a:ext cx="2815847" cy="584775"/>
-          </a:xfrm>
-          <a:prstGeom prst="rect">
-            <a:avLst/>
-          </a:prstGeom>
-        </p:spPr>
-        <p:txBody>
-          <a:bodyPr wrap="square">
-            <a:spAutoFit/>
-          </a:bodyPr>
-          <a:lstStyle/>
-          <a:p>
-            <a:pPr algn="ctr"/>
-            <a:r>
-              <a:rPr lang="en-US" sz="1600" dirty="0" smtClean="0"/>
-              <a:t>Short product </a:t>
-            </a:r>
-            <a:r>
-              <a:rPr lang="en-US" sz="1600" dirty="0">
-                <a:cs typeface="Courier New"/>
-              </a:rPr>
-              <a:t>(</a:t>
-            </a:r>
-            <a:r>
-              <a:rPr lang="is-IS" sz="1600" dirty="0">
-                <a:cs typeface="Courier New"/>
-              </a:rPr>
-              <a:t>362 aa</a:t>
-            </a:r>
-            <a:r>
-              <a:rPr lang="en-US" sz="1600" dirty="0" smtClean="0">
-                <a:cs typeface="Courier New"/>
-              </a:rPr>
-              <a:t>) </a:t>
-            </a:r>
-            <a:r>
-              <a:rPr lang="en-US" sz="1600" dirty="0" smtClean="0"/>
-              <a:t>is similar</a:t>
-            </a:r>
-          </a:p>
-          <a:p>
-            <a:pPr algn="ctr"/>
-            <a:r>
-              <a:rPr lang="en-US" sz="1600" dirty="0" smtClean="0"/>
-              <a:t>to the </a:t>
-            </a:r>
-            <a:r>
-              <a:rPr lang="en-US" sz="1600" dirty="0" err="1" smtClean="0"/>
-              <a:t>ChlI</a:t>
-            </a:r>
-            <a:r>
-              <a:rPr lang="en-US" sz="1600" dirty="0" smtClean="0"/>
-              <a:t> protein</a:t>
-            </a:r>
-          </a:p>
-        </p:txBody>
-      </p:sp>
-      <p:pic>
-        <p:nvPicPr>
-          <p:cNvPr id="290" name="Picture 289"/>
-          <p:cNvPicPr>
-            <a:picLocks noChangeAspect="1"/>
-          </p:cNvPicPr>
-          <p:nvPr/>
-        </p:nvPicPr>
-        <p:blipFill>
-          <a:blip r:embed="rId7"/>
-          <a:stretch>
-            <a:fillRect/>
-          </a:stretch>
-        </p:blipFill>
-        <p:spPr>
-          <a:xfrm>
-            <a:off x="5004401" y="4594946"/>
-            <a:ext cx="2353586" cy="292608"/>
-          </a:xfrm>
-          <a:prstGeom prst="rect">
-            <a:avLst/>
-          </a:prstGeom>
-        </p:spPr>
-      </p:pic>
-      <p:pic>
-        <p:nvPicPr>
-          <p:cNvPr id="291" name="Picture 290"/>
-          <p:cNvPicPr>
-            <a:picLocks noChangeAspect="1"/>
-          </p:cNvPicPr>
-          <p:nvPr/>
-        </p:nvPicPr>
-        <p:blipFill>
-          <a:blip r:embed="rId8"/>
-          <a:stretch>
-            <a:fillRect/>
-          </a:stretch>
-        </p:blipFill>
-        <p:spPr>
-          <a:xfrm>
-            <a:off x="161408" y="4594946"/>
-            <a:ext cx="4389120" cy="292608"/>
-          </a:xfrm>
-          <a:prstGeom prst="rect">
-            <a:avLst/>
-          </a:prstGeom>
-        </p:spPr>
-      </p:pic>
-      <p:sp>
-        <p:nvSpPr>
-          <p:cNvPr id="293" name="Rectangle 292"/>
-          <p:cNvSpPr/>
-          <p:nvPr/>
-        </p:nvSpPr>
-        <p:spPr>
-          <a:xfrm>
-            <a:off x="1229816" y="4119169"/>
-            <a:ext cx="5350392" cy="338554"/>
-          </a:xfrm>
-          <a:prstGeom prst="rect">
-            <a:avLst/>
-          </a:prstGeom>
-        </p:spPr>
-        <p:txBody>
-          <a:bodyPr wrap="square">
-            <a:spAutoFit/>
-          </a:bodyPr>
-          <a:lstStyle/>
-          <a:p>
-            <a:pPr algn="ctr"/>
-            <a:r>
-              <a:rPr lang="en-US" sz="1600" i="1" dirty="0" err="1"/>
-              <a:t>Synechocystis</a:t>
-            </a:r>
-            <a:r>
-              <a:rPr lang="en-US" sz="1600" i="1" dirty="0"/>
-              <a:t> sp. PCC 6803</a:t>
-            </a:r>
-            <a:r>
-              <a:rPr lang="en-US" sz="1600" dirty="0"/>
-              <a:t> </a:t>
-            </a:r>
-            <a:r>
-              <a:rPr lang="en-US" sz="1600" dirty="0" smtClean="0"/>
-              <a:t>(photosynthetic cyanobacteria):</a:t>
-            </a:r>
-          </a:p>
-        </p:txBody>
-      </p:sp>
       <p:cxnSp>
         <p:nvCxnSpPr>
-          <p:cNvPr id="294" name="Straight Connector 293"/>
+          <p:cNvPr id="146" name="Straight Connector 145"/>
           <p:cNvCxnSpPr/>
           <p:nvPr/>
         </p:nvCxnSpPr>
         <p:spPr>
           <a:xfrm>
-            <a:off x="108337" y="4028687"/>
-            <a:ext cx="7981563" cy="27550"/>
+            <a:off x="5529927" y="2615816"/>
+            <a:ext cx="0" cy="584650"/>
           </a:xfrm>
           <a:prstGeom prst="line">
             <a:avLst/>
           </a:prstGeom>
           <a:ln>
             <a:solidFill>
-              <a:schemeClr val="bg1">
-                <a:lumMod val="50000"/>
-              </a:schemeClr>
+              <a:srgbClr val="000000"/>
             </a:solidFill>
-            <a:tailEnd type="none"/>
+            <a:tailEnd type="triangle"/>
           </a:ln>
         </p:spPr>
         <p:style>
@@ -4216,18 +4823,26 @@
       </p:cxnSp>
       <p:sp>
         <p:nvSpPr>
-          <p:cNvPr id="296" name="Rectangle 295"/>
+          <p:cNvPr id="147" name="Rectangle 146"/>
           <p:cNvSpPr/>
           <p:nvPr/>
         </p:nvSpPr>
         <p:spPr>
           <a:xfrm>
-            <a:off x="492790" y="4887554"/>
-            <a:ext cx="3558510" cy="584775"/>
+            <a:off x="2130789" y="2680829"/>
+            <a:ext cx="3774800" cy="338554"/>
           </a:xfrm>
           <a:prstGeom prst="rect">
             <a:avLst/>
           </a:prstGeom>
+          <a:solidFill>
+            <a:schemeClr val="bg1"/>
+          </a:solidFill>
+          <a:ln>
+            <a:solidFill>
+              <a:schemeClr val="tx1"/>
+            </a:solidFill>
+          </a:ln>
         </p:spPr>
         <p:txBody>
           <a:bodyPr wrap="square">
@@ -4237,82 +4852,34 @@
           <a:p>
             <a:pPr algn="ctr"/>
             <a:r>
-              <a:rPr lang="fi-FI" sz="1600" dirty="0"/>
-              <a:t>BAA16787.1 </a:t>
-            </a:r>
-            <a:r>
-              <a:rPr lang="mr-IN" sz="1600" dirty="0"/>
-              <a:t>–</a:t>
-            </a:r>
-            <a:r>
-              <a:rPr lang="fi-FI" sz="1600" dirty="0"/>
-              <a:t> </a:t>
-            </a:r>
-            <a:r>
-              <a:rPr lang="en-US" sz="1600" dirty="0" err="1"/>
-              <a:t>ChlD</a:t>
-            </a:r>
-            <a:r>
-              <a:rPr lang="en-US" sz="1600" dirty="0"/>
-              <a:t> </a:t>
-            </a:r>
-            <a:r>
               <a:rPr lang="en-US" sz="1600" dirty="0" smtClean="0"/>
-              <a:t>protein</a:t>
-            </a:r>
-          </a:p>
-          <a:p>
-            <a:pPr algn="ctr"/>
-            <a:r>
-              <a:rPr lang="en-US" sz="1600" dirty="0" smtClean="0"/>
-              <a:t>(medium </a:t>
-            </a:r>
-            <a:r>
-              <a:rPr lang="en-US" sz="1600" dirty="0"/>
-              <a:t>Mg-</a:t>
-            </a:r>
-            <a:r>
-              <a:rPr lang="en-US" sz="1600" dirty="0" err="1"/>
-              <a:t>chelatase</a:t>
-            </a:r>
-            <a:r>
-              <a:rPr lang="en-US" sz="1600" dirty="0"/>
-              <a:t> </a:t>
-            </a:r>
-            <a:r>
-              <a:rPr lang="en-US" sz="1600" dirty="0" smtClean="0"/>
-              <a:t>subunit, </a:t>
-            </a:r>
-            <a:r>
-              <a:rPr lang="nl-NL" sz="1600" dirty="0" smtClean="0"/>
-              <a:t>676 </a:t>
-            </a:r>
-            <a:r>
-              <a:rPr lang="nl-NL" sz="1600" dirty="0" err="1"/>
-              <a:t>aa</a:t>
-            </a:r>
-            <a:r>
-              <a:rPr lang="en-US" sz="1600" dirty="0"/>
-              <a:t>)</a:t>
-            </a:r>
-            <a:endParaRPr lang="en-US" sz="1600" dirty="0" smtClean="0"/>
-          </a:p>
-        </p:txBody>
-      </p:sp>
-      <p:sp>
-        <p:nvSpPr>
-          <p:cNvPr id="298" name="Rectangle 297"/>
+              <a:t>Transcription + translation</a:t>
+            </a:r>
+          </a:p>
+        </p:txBody>
+      </p:sp>
+      <p:sp>
+        <p:nvSpPr>
+          <p:cNvPr id="149" name="Rectangle 148"/>
           <p:cNvSpPr/>
           <p:nvPr/>
         </p:nvSpPr>
         <p:spPr>
           <a:xfrm>
-            <a:off x="4557496" y="4887554"/>
-            <a:ext cx="3558510" cy="584775"/>
+            <a:off x="2130789" y="5821718"/>
+            <a:ext cx="3774800" cy="338554"/>
           </a:xfrm>
           <a:prstGeom prst="rect">
             <a:avLst/>
           </a:prstGeom>
+          <a:solidFill>
+            <a:schemeClr val="bg1"/>
+          </a:solidFill>
+          <a:ln>
+            <a:solidFill>
+              <a:schemeClr val="tx1"/>
+            </a:solidFill>
+          </a:ln>
         </p:spPr>
         <p:txBody>
           <a:bodyPr wrap="square">
@@ -4322,63 +4889,8 @@
           <a:p>
             <a:pPr algn="ctr"/>
             <a:r>
-              <a:rPr lang="en-US" sz="1600" dirty="0"/>
-              <a:t>BAA17166.1 </a:t>
-            </a:r>
-            <a:r>
-              <a:rPr lang="mr-IN" sz="1600" dirty="0"/>
-              <a:t>–</a:t>
-            </a:r>
-            <a:r>
-              <a:rPr lang="en-US" sz="1600" dirty="0"/>
-              <a:t> </a:t>
-            </a:r>
-            <a:r>
-              <a:rPr lang="en-US" sz="1600" dirty="0" err="1"/>
-              <a:t>ChlI</a:t>
-            </a:r>
-            <a:r>
-              <a:rPr lang="en-US" sz="1600" dirty="0"/>
-              <a:t> </a:t>
-            </a:r>
-            <a:r>
-              <a:rPr lang="en-US" sz="1600" dirty="0" smtClean="0"/>
-              <a:t>protein</a:t>
-            </a:r>
-          </a:p>
-          <a:p>
-            <a:pPr algn="ctr"/>
-            <a:r>
-              <a:rPr lang="en-US" sz="1600" dirty="0" smtClean="0"/>
-              <a:t>(small </a:t>
-            </a:r>
-            <a:r>
-              <a:rPr lang="en-US" sz="1600" dirty="0"/>
-              <a:t>Mg-</a:t>
-            </a:r>
-            <a:r>
-              <a:rPr lang="en-US" sz="1600" dirty="0" err="1"/>
-              <a:t>chelatase</a:t>
-            </a:r>
-            <a:r>
-              <a:rPr lang="en-US" sz="1600" dirty="0"/>
-              <a:t> </a:t>
-            </a:r>
-            <a:r>
-              <a:rPr lang="en-US" sz="1600" dirty="0" smtClean="0"/>
-              <a:t>subunit, </a:t>
-            </a:r>
-            <a:r>
-              <a:rPr lang="nl-NL" sz="1600" dirty="0" smtClean="0"/>
-              <a:t>357 </a:t>
-            </a:r>
-            <a:r>
-              <a:rPr lang="nl-NL" sz="1600" dirty="0" err="1"/>
-              <a:t>aa</a:t>
-            </a:r>
-            <a:r>
-              <a:rPr lang="en-US" sz="1600" dirty="0"/>
-              <a:t>)</a:t>
+              <a:rPr lang="en-US" sz="1600" smtClean="0"/>
+              <a:t>Transcription</a:t>
             </a:r>
             <a:endParaRPr lang="en-US" sz="1600" dirty="0" smtClean="0"/>
           </a:p>
@@ -4386,18 +4898,26 @@
       </p:sp>
       <p:sp>
         <p:nvSpPr>
-          <p:cNvPr id="34" name="Rectangle 33"/>
+          <p:cNvPr id="151" name="Rectangle 150"/>
           <p:cNvSpPr/>
           <p:nvPr/>
         </p:nvSpPr>
         <p:spPr>
           <a:xfrm>
-            <a:off x="4928827" y="563787"/>
-            <a:ext cx="3161073" cy="584775"/>
+            <a:off x="2130789" y="6230835"/>
+            <a:ext cx="3774800" cy="338554"/>
           </a:xfrm>
           <a:prstGeom prst="rect">
             <a:avLst/>
           </a:prstGeom>
+          <a:solidFill>
+            <a:schemeClr val="bg1"/>
+          </a:solidFill>
+          <a:ln>
+            <a:solidFill>
+              <a:schemeClr val="tx1"/>
+            </a:solidFill>
+          </a:ln>
         </p:spPr>
         <p:txBody>
           <a:bodyPr wrap="square">
@@ -4408,36 +4928,69 @@
             <a:pPr algn="ctr"/>
             <a:r>
               <a:rPr lang="en-US" sz="1600" dirty="0" smtClean="0"/>
-              <a:t>fs-</a:t>
+              <a:t>Translation with </a:t>
             </a:r>
             <a:r>
               <a:rPr lang="en-US" sz="1600" dirty="0" err="1" smtClean="0"/>
-              <a:t>chlD</a:t>
-            </a:r>
-            <a:r>
-              <a:rPr lang="en-US" sz="1600" dirty="0" smtClean="0"/>
-              <a:t> gene </a:t>
-            </a:r>
-            <a:r>
-              <a:rPr lang="en-US" sz="1600" dirty="0"/>
-              <a:t>from </a:t>
-            </a:r>
-            <a:r>
-              <a:rPr lang="en-US" sz="1600" i="1" dirty="0" err="1"/>
-              <a:t>Methanocaldococcus</a:t>
-            </a:r>
-            <a:r>
-              <a:rPr lang="en-US" sz="1600" i="1" dirty="0"/>
-              <a:t> sp. </a:t>
-            </a:r>
-            <a:r>
-              <a:rPr lang="en-US" sz="1600" i="1" dirty="0" smtClean="0"/>
-              <a:t>FS406-22</a:t>
-            </a:r>
-            <a:endParaRPr lang="en-US" sz="1600" i="1" dirty="0" smtClean="0"/>
-          </a:p>
-        </p:txBody>
-      </p:sp>
+              <a:t>frameshifting</a:t>
+            </a:r>
+            <a:endParaRPr lang="en-US" sz="1600" dirty="0" smtClean="0"/>
+          </a:p>
+        </p:txBody>
+      </p:sp>
+      <p:sp>
+        <p:nvSpPr>
+          <p:cNvPr id="158" name="Rectangle 157"/>
+          <p:cNvSpPr/>
+          <p:nvPr/>
+        </p:nvSpPr>
+        <p:spPr>
+          <a:xfrm>
+            <a:off x="4824658" y="6728167"/>
+            <a:ext cx="605036" cy="338554"/>
+          </a:xfrm>
+          <a:prstGeom prst="rect">
+            <a:avLst/>
+          </a:prstGeom>
+        </p:spPr>
+        <p:txBody>
+          <a:bodyPr wrap="square">
+            <a:spAutoFit/>
+          </a:bodyPr>
+          <a:lstStyle/>
+          <a:p>
+            <a:pPr algn="ctr"/>
+            <a:r>
+              <a:rPr lang="en-US" sz="1600" b="1" dirty="0" smtClean="0"/>
+              <a:t>Yes</a:t>
+            </a:r>
+            <a:endParaRPr lang="en-US" sz="1600" b="1" dirty="0"/>
+          </a:p>
+        </p:txBody>
+      </p:sp>
+      <p:pic>
+        <p:nvPicPr>
+          <p:cNvPr id="50" name="Picture 49"/>
+          <p:cNvPicPr>
+            <a:picLocks noChangeAspect="1"/>
+          </p:cNvPicPr>
+          <p:nvPr/>
+        </p:nvPicPr>
+        <p:blipFill rotWithShape="1">
+          <a:blip r:embed="rId5"/>
+          <a:srcRect r="48731"/>
+          <a:stretch/>
+        </p:blipFill>
+        <p:spPr>
+          <a:xfrm>
+            <a:off x="907113" y="7212522"/>
+            <a:ext cx="2256780" cy="292608"/>
+          </a:xfrm>
+          <a:prstGeom prst="rect">
+            <a:avLst/>
+          </a:prstGeom>
+        </p:spPr>
+      </p:pic>
     </p:spTree>
     <p:extLst>
       <p:ext uri="{BB962C8B-B14F-4D97-AF65-F5344CB8AC3E}">

</xml_diff>